<commit_message>
adding most recent beta pres.
</commit_message>
<xml_diff>
--- a/documents/presentations/beta-presentation/team-urban-science-beta-presentation.pptx
+++ b/documents/presentations/beta-presentation/team-urban-science-beta-presentation.pptx
@@ -217,8 +217,12 @@
               <a:defRPr/>
             </a:pPr>
             <a:r>
-              <a:rPr lang="en-US"/>
-              <a:t>Team &lt;Company Name&gt;</a:t>
+              <a:rPr lang="en-US" dirty="0"/>
+              <a:t>Team </a:t>
+            </a:r>
+            <a:r>
+              <a:rPr lang="en-US" dirty="0" smtClean="0"/>
+              <a:t>Urban Science</a:t>
             </a:r>
             <a:endParaRPr lang="en-US" dirty="0"/>
           </a:p>
@@ -264,8 +268,16 @@
               <a:defRPr/>
             </a:pPr>
             <a:r>
-              <a:rPr lang="en-US"/>
-              <a:t>Beta Presentation &lt;Project Title&gt;</a:t>
+              <a:rPr lang="en-US" dirty="0"/>
+              <a:t>Beta Presentation </a:t>
+            </a:r>
+            <a:r>
+              <a:rPr lang="en-US" dirty="0" err="1" smtClean="0"/>
+              <a:t>Infographics</a:t>
+            </a:r>
+            <a:r>
+              <a:rPr lang="en-US" dirty="0" smtClean="0"/>
+              <a:t> Generator</a:t>
             </a:r>
             <a:endParaRPr lang="en-US" dirty="0"/>
           </a:p>
@@ -388,7 +400,7 @@
           <a:blip r:embed="rId2" cstate="print">
             <a:extLst>
               <a:ext uri="{28A0092B-C50C-407E-A947-70E740481C1C}">
-                <a14:useLocalDpi xmlns:a14="http://schemas.microsoft.com/office/drawing/2010/main" xmlns="" val="0"/>
+                <a14:useLocalDpi xmlns="" xmlns:a14="http://schemas.microsoft.com/office/drawing/2010/main" val="0"/>
               </a:ext>
             </a:extLst>
           </a:blip>
@@ -411,14 +423,14 @@
           </a:ln>
           <a:extLst>
             <a:ext uri="{909E8E84-426E-40DD-AFC4-6F175D3DCCD1}">
-              <a14:hiddenFill xmlns:a14="http://schemas.microsoft.com/office/drawing/2010/main" xmlns="">
+              <a14:hiddenFill xmlns="" xmlns:a14="http://schemas.microsoft.com/office/drawing/2010/main">
                 <a:solidFill>
                   <a:srgbClr val="FFFFFF"/>
                 </a:solidFill>
               </a14:hiddenFill>
             </a:ext>
             <a:ext uri="{91240B29-F687-4F45-9708-019B960494DF}">
-              <a14:hiddenLine xmlns:a14="http://schemas.microsoft.com/office/drawing/2010/main" xmlns="" w="9525">
+              <a14:hiddenLine xmlns="" xmlns:a14="http://schemas.microsoft.com/office/drawing/2010/main" w="9525">
                 <a:solidFill>
                   <a:srgbClr val="000000"/>
                 </a:solidFill>
@@ -452,14 +464,14 @@
           </a:ln>
           <a:extLst>
             <a:ext uri="{909E8E84-426E-40DD-AFC4-6F175D3DCCD1}">
-              <a14:hiddenFill xmlns:a14="http://schemas.microsoft.com/office/drawing/2010/main" xmlns="">
+              <a14:hiddenFill xmlns="" xmlns:a14="http://schemas.microsoft.com/office/drawing/2010/main">
                 <a:solidFill>
                   <a:srgbClr val="FFFFFF"/>
                 </a:solidFill>
               </a14:hiddenFill>
             </a:ext>
             <a:ext uri="{91240B29-F687-4F45-9708-019B960494DF}">
-              <a14:hiddenLine xmlns:a14="http://schemas.microsoft.com/office/drawing/2010/main" xmlns="" w="9525">
+              <a14:hiddenLine xmlns="" xmlns:a14="http://schemas.microsoft.com/office/drawing/2010/main" w="9525">
                 <a:solidFill>
                   <a:srgbClr val="000000"/>
                 </a:solidFill>
@@ -593,7 +605,7 @@
     </p:spTree>
     <p:extLst>
       <p:ext uri="{BB962C8B-B14F-4D97-AF65-F5344CB8AC3E}">
-        <p14:creationId xmlns:p14="http://schemas.microsoft.com/office/powerpoint/2010/main" xmlns="" val="232417806"/>
+        <p14:creationId xmlns="" xmlns:p14="http://schemas.microsoft.com/office/powerpoint/2010/main" val="232417806"/>
       </p:ext>
     </p:extLst>
   </p:cSld>
@@ -664,9 +676,10 @@
               <a:defRPr/>
             </a:pPr>
             <a:r>
-              <a:rPr lang="en-US"/>
-              <a:t>Team &lt;Company Name&gt;</a:t>
-            </a:r>
+              <a:rPr lang="en-US" dirty="0" smtClean="0"/>
+              <a:t>Team Urban Science</a:t>
+            </a:r>
+            <a:endParaRPr lang="en-US" dirty="0"/>
           </a:p>
         </p:txBody>
       </p:sp>
@@ -710,9 +723,18 @@
               <a:defRPr/>
             </a:pPr>
             <a:r>
-              <a:rPr lang="en-US"/>
-              <a:t>Beta Presentation &lt;Project Title&gt;</a:t>
-            </a:r>
+              <a:rPr lang="en-US" dirty="0" smtClean="0"/>
+              <a:t>Beta Presentation </a:t>
+            </a:r>
+            <a:r>
+              <a:rPr lang="en-US" dirty="0" err="1" smtClean="0"/>
+              <a:t>Infographics</a:t>
+            </a:r>
+            <a:r>
+              <a:rPr lang="en-US" dirty="0" smtClean="0"/>
+              <a:t> Generator</a:t>
+            </a:r>
+            <a:endParaRPr lang="en-US" dirty="0"/>
           </a:p>
         </p:txBody>
       </p:sp>
@@ -909,7 +931,7 @@
     </p:spTree>
     <p:extLst>
       <p:ext uri="{BB962C8B-B14F-4D97-AF65-F5344CB8AC3E}">
-        <p14:creationId xmlns:p14="http://schemas.microsoft.com/office/powerpoint/2010/main" xmlns="" val="2158654164"/>
+        <p14:creationId xmlns="" xmlns:p14="http://schemas.microsoft.com/office/powerpoint/2010/main" val="2158654164"/>
       </p:ext>
     </p:extLst>
   </p:cSld>
@@ -1079,7 +1101,7 @@
           </a:ln>
           <a:extLst>
             <a:ext uri="{909E8E84-426E-40DD-AFC4-6F175D3DCCD1}">
-              <a14:hiddenFill xmlns:a14="http://schemas.microsoft.com/office/drawing/2010/main" xmlns="">
+              <a14:hiddenFill xmlns="" xmlns:a14="http://schemas.microsoft.com/office/drawing/2010/main">
                 <a:solidFill>
                   <a:srgbClr val="FFFFFF"/>
                 </a:solidFill>
@@ -1102,14 +1124,14 @@
           <a:noFill/>
           <a:extLst>
             <a:ext uri="{909E8E84-426E-40DD-AFC4-6F175D3DCCD1}">
-              <a14:hiddenFill xmlns:a14="http://schemas.microsoft.com/office/drawing/2010/main" xmlns="">
+              <a14:hiddenFill xmlns="" xmlns:a14="http://schemas.microsoft.com/office/drawing/2010/main">
                 <a:solidFill>
                   <a:srgbClr val="FFFFFF"/>
                 </a:solidFill>
               </a14:hiddenFill>
             </a:ext>
             <a:ext uri="{91240B29-F687-4F45-9708-019B960494DF}">
-              <a14:hiddenLine xmlns:a14="http://schemas.microsoft.com/office/drawing/2010/main" xmlns="" w="9525">
+              <a14:hiddenLine xmlns="" xmlns:a14="http://schemas.microsoft.com/office/drawing/2010/main" w="9525">
                 <a:solidFill>
                   <a:srgbClr val="000000"/>
                 </a:solidFill>
@@ -1150,14 +1172,14 @@
         <p:spPr bwMode="auto">
           <a:extLst>
             <a:ext uri="{909E8E84-426E-40DD-AFC4-6F175D3DCCD1}">
-              <a14:hiddenFill xmlns:a14="http://schemas.microsoft.com/office/drawing/2010/main" xmlns="">
+              <a14:hiddenFill xmlns="" xmlns:a14="http://schemas.microsoft.com/office/drawing/2010/main">
                 <a:solidFill>
                   <a:srgbClr val="FFFFFF"/>
                 </a:solidFill>
               </a14:hiddenFill>
             </a:ext>
             <a:ext uri="{91240B29-F687-4F45-9708-019B960494DF}">
-              <a14:hiddenLine xmlns:a14="http://schemas.microsoft.com/office/drawing/2010/main" xmlns="" w="9525">
+              <a14:hiddenLine xmlns="" xmlns:a14="http://schemas.microsoft.com/office/drawing/2010/main" w="9525">
                 <a:solidFill>
                   <a:srgbClr val="000000"/>
                 </a:solidFill>
@@ -1302,14 +1324,14 @@
         <p:spPr bwMode="auto">
           <a:extLst>
             <a:ext uri="{909E8E84-426E-40DD-AFC4-6F175D3DCCD1}">
-              <a14:hiddenFill xmlns:a14="http://schemas.microsoft.com/office/drawing/2010/main" xmlns="">
+              <a14:hiddenFill xmlns="" xmlns:a14="http://schemas.microsoft.com/office/drawing/2010/main">
                 <a:solidFill>
                   <a:srgbClr val="FFFFFF"/>
                 </a:solidFill>
               </a14:hiddenFill>
             </a:ext>
             <a:ext uri="{91240B29-F687-4F45-9708-019B960494DF}">
-              <a14:hiddenLine xmlns:a14="http://schemas.microsoft.com/office/drawing/2010/main" xmlns="" w="9525">
+              <a14:hiddenLine xmlns="" xmlns:a14="http://schemas.microsoft.com/office/drawing/2010/main" w="9525">
                 <a:solidFill>
                   <a:srgbClr val="000000"/>
                 </a:solidFill>
@@ -1454,14 +1476,14 @@
         <p:spPr bwMode="auto">
           <a:extLst>
             <a:ext uri="{909E8E84-426E-40DD-AFC4-6F175D3DCCD1}">
-              <a14:hiddenFill xmlns:a14="http://schemas.microsoft.com/office/drawing/2010/main" xmlns="">
+              <a14:hiddenFill xmlns="" xmlns:a14="http://schemas.microsoft.com/office/drawing/2010/main">
                 <a:solidFill>
                   <a:srgbClr val="FFFFFF"/>
                 </a:solidFill>
               </a14:hiddenFill>
             </a:ext>
             <a:ext uri="{91240B29-F687-4F45-9708-019B960494DF}">
-              <a14:hiddenLine xmlns:a14="http://schemas.microsoft.com/office/drawing/2010/main" xmlns="" w="9525">
+              <a14:hiddenLine xmlns="" xmlns:a14="http://schemas.microsoft.com/office/drawing/2010/main" w="9525">
                 <a:solidFill>
                   <a:srgbClr val="000000"/>
                 </a:solidFill>
@@ -1606,14 +1628,14 @@
         <p:spPr bwMode="auto">
           <a:extLst>
             <a:ext uri="{909E8E84-426E-40DD-AFC4-6F175D3DCCD1}">
-              <a14:hiddenFill xmlns:a14="http://schemas.microsoft.com/office/drawing/2010/main" xmlns="">
+              <a14:hiddenFill xmlns="" xmlns:a14="http://schemas.microsoft.com/office/drawing/2010/main">
                 <a:solidFill>
                   <a:srgbClr val="FFFFFF"/>
                 </a:solidFill>
               </a14:hiddenFill>
             </a:ext>
             <a:ext uri="{91240B29-F687-4F45-9708-019B960494DF}">
-              <a14:hiddenLine xmlns:a14="http://schemas.microsoft.com/office/drawing/2010/main" xmlns="" w="9525">
+              <a14:hiddenLine xmlns="" xmlns:a14="http://schemas.microsoft.com/office/drawing/2010/main" w="9525">
                 <a:solidFill>
                   <a:srgbClr val="000000"/>
                 </a:solidFill>
@@ -1793,14 +1815,14 @@
         <p:spPr bwMode="auto">
           <a:extLst>
             <a:ext uri="{909E8E84-426E-40DD-AFC4-6F175D3DCCD1}">
-              <a14:hiddenFill xmlns:a14="http://schemas.microsoft.com/office/drawing/2010/main" xmlns="">
+              <a14:hiddenFill xmlns="" xmlns:a14="http://schemas.microsoft.com/office/drawing/2010/main">
                 <a:solidFill>
                   <a:srgbClr val="FFFFFF"/>
                 </a:solidFill>
               </a14:hiddenFill>
             </a:ext>
             <a:ext uri="{91240B29-F687-4F45-9708-019B960494DF}">
-              <a14:hiddenLine xmlns:a14="http://schemas.microsoft.com/office/drawing/2010/main" xmlns="" w="9525">
+              <a14:hiddenLine xmlns="" xmlns:a14="http://schemas.microsoft.com/office/drawing/2010/main" w="9525">
                 <a:solidFill>
                   <a:srgbClr val="000000"/>
                 </a:solidFill>
@@ -1947,14 +1969,14 @@
         <p:spPr bwMode="auto">
           <a:extLst>
             <a:ext uri="{909E8E84-426E-40DD-AFC4-6F175D3DCCD1}">
-              <a14:hiddenFill xmlns:a14="http://schemas.microsoft.com/office/drawing/2010/main" xmlns="">
+              <a14:hiddenFill xmlns="" xmlns:a14="http://schemas.microsoft.com/office/drawing/2010/main">
                 <a:solidFill>
                   <a:srgbClr val="FFFFFF"/>
                 </a:solidFill>
               </a14:hiddenFill>
             </a:ext>
             <a:ext uri="{91240B29-F687-4F45-9708-019B960494DF}">
-              <a14:hiddenLine xmlns:a14="http://schemas.microsoft.com/office/drawing/2010/main" xmlns="" w="9525">
+              <a14:hiddenLine xmlns="" xmlns:a14="http://schemas.microsoft.com/office/drawing/2010/main" w="9525">
                 <a:solidFill>
                   <a:srgbClr val="000000"/>
                 </a:solidFill>
@@ -2101,14 +2123,14 @@
         <p:spPr bwMode="auto">
           <a:extLst>
             <a:ext uri="{909E8E84-426E-40DD-AFC4-6F175D3DCCD1}">
-              <a14:hiddenFill xmlns:a14="http://schemas.microsoft.com/office/drawing/2010/main" xmlns="">
+              <a14:hiddenFill xmlns="" xmlns:a14="http://schemas.microsoft.com/office/drawing/2010/main">
                 <a:solidFill>
                   <a:srgbClr val="FFFFFF"/>
                 </a:solidFill>
               </a14:hiddenFill>
             </a:ext>
             <a:ext uri="{91240B29-F687-4F45-9708-019B960494DF}">
-              <a14:hiddenLine xmlns:a14="http://schemas.microsoft.com/office/drawing/2010/main" xmlns="" w="9525">
+              <a14:hiddenLine xmlns="" xmlns:a14="http://schemas.microsoft.com/office/drawing/2010/main" w="9525">
                 <a:solidFill>
                   <a:srgbClr val="000000"/>
                 </a:solidFill>
@@ -2255,14 +2277,14 @@
         <p:spPr bwMode="auto">
           <a:extLst>
             <a:ext uri="{909E8E84-426E-40DD-AFC4-6F175D3DCCD1}">
-              <a14:hiddenFill xmlns:a14="http://schemas.microsoft.com/office/drawing/2010/main" xmlns="">
+              <a14:hiddenFill xmlns="" xmlns:a14="http://schemas.microsoft.com/office/drawing/2010/main">
                 <a:solidFill>
                   <a:srgbClr val="FFFFFF"/>
                 </a:solidFill>
               </a14:hiddenFill>
             </a:ext>
             <a:ext uri="{91240B29-F687-4F45-9708-019B960494DF}">
-              <a14:hiddenLine xmlns:a14="http://schemas.microsoft.com/office/drawing/2010/main" xmlns="" w="9525">
+              <a14:hiddenLine xmlns="" xmlns:a14="http://schemas.microsoft.com/office/drawing/2010/main" w="9525">
                 <a:solidFill>
                   <a:srgbClr val="000000"/>
                 </a:solidFill>
@@ -2430,7 +2452,7 @@
           </a:ln>
           <a:extLst>
             <a:ext uri="{909E8E84-426E-40DD-AFC4-6F175D3DCCD1}">
-              <a14:hiddenFill xmlns:a14="http://schemas.microsoft.com/office/drawing/2010/main" xmlns="">
+              <a14:hiddenFill xmlns="" xmlns:a14="http://schemas.microsoft.com/office/drawing/2010/main">
                 <a:solidFill>
                   <a:srgbClr val="FFFFFF"/>
                 </a:solidFill>
@@ -2457,14 +2479,14 @@
           <a:noFill/>
           <a:extLst>
             <a:ext uri="{909E8E84-426E-40DD-AFC4-6F175D3DCCD1}">
-              <a14:hiddenFill xmlns:a14="http://schemas.microsoft.com/office/drawing/2010/main" xmlns="">
+              <a14:hiddenFill xmlns="" xmlns:a14="http://schemas.microsoft.com/office/drawing/2010/main">
                 <a:solidFill>
                   <a:srgbClr val="FFFFFF"/>
                 </a:solidFill>
               </a14:hiddenFill>
             </a:ext>
             <a:ext uri="{91240B29-F687-4F45-9708-019B960494DF}">
-              <a14:hiddenLine xmlns:a14="http://schemas.microsoft.com/office/drawing/2010/main" xmlns="" w="9525">
+              <a14:hiddenLine xmlns="" xmlns:a14="http://schemas.microsoft.com/office/drawing/2010/main" w="9525">
                 <a:solidFill>
                   <a:srgbClr val="000000"/>
                 </a:solidFill>
@@ -2530,14 +2552,14 @@
         <p:spPr bwMode="auto">
           <a:extLst>
             <a:ext uri="{909E8E84-426E-40DD-AFC4-6F175D3DCCD1}">
-              <a14:hiddenFill xmlns:a14="http://schemas.microsoft.com/office/drawing/2010/main" xmlns="">
+              <a14:hiddenFill xmlns="" xmlns:a14="http://schemas.microsoft.com/office/drawing/2010/main">
                 <a:solidFill>
                   <a:srgbClr val="FFFFFF"/>
                 </a:solidFill>
               </a14:hiddenFill>
             </a:ext>
             <a:ext uri="{91240B29-F687-4F45-9708-019B960494DF}">
-              <a14:hiddenLine xmlns:a14="http://schemas.microsoft.com/office/drawing/2010/main" xmlns="" w="9525">
+              <a14:hiddenLine xmlns="" xmlns:a14="http://schemas.microsoft.com/office/drawing/2010/main" w="9525">
                 <a:solidFill>
                   <a:srgbClr val="000000"/>
                 </a:solidFill>
@@ -2684,14 +2706,14 @@
         <p:spPr bwMode="auto">
           <a:extLst>
             <a:ext uri="{909E8E84-426E-40DD-AFC4-6F175D3DCCD1}">
-              <a14:hiddenFill xmlns:a14="http://schemas.microsoft.com/office/drawing/2010/main" xmlns="">
+              <a14:hiddenFill xmlns="" xmlns:a14="http://schemas.microsoft.com/office/drawing/2010/main">
                 <a:solidFill>
                   <a:srgbClr val="FFFFFF"/>
                 </a:solidFill>
               </a14:hiddenFill>
             </a:ext>
             <a:ext uri="{91240B29-F687-4F45-9708-019B960494DF}">
-              <a14:hiddenLine xmlns:a14="http://schemas.microsoft.com/office/drawing/2010/main" xmlns="" w="9525">
+              <a14:hiddenLine xmlns="" xmlns:a14="http://schemas.microsoft.com/office/drawing/2010/main" w="9525">
                 <a:solidFill>
                   <a:srgbClr val="000000"/>
                 </a:solidFill>
@@ -2838,14 +2860,14 @@
         <p:spPr bwMode="auto">
           <a:extLst>
             <a:ext uri="{909E8E84-426E-40DD-AFC4-6F175D3DCCD1}">
-              <a14:hiddenFill xmlns:a14="http://schemas.microsoft.com/office/drawing/2010/main" xmlns="">
+              <a14:hiddenFill xmlns="" xmlns:a14="http://schemas.microsoft.com/office/drawing/2010/main">
                 <a:solidFill>
                   <a:srgbClr val="FFFFFF"/>
                 </a:solidFill>
               </a14:hiddenFill>
             </a:ext>
             <a:ext uri="{91240B29-F687-4F45-9708-019B960494DF}">
-              <a14:hiddenLine xmlns:a14="http://schemas.microsoft.com/office/drawing/2010/main" xmlns="" w="9525">
+              <a14:hiddenLine xmlns="" xmlns:a14="http://schemas.microsoft.com/office/drawing/2010/main" w="9525">
                 <a:solidFill>
                   <a:srgbClr val="000000"/>
                 </a:solidFill>
@@ -2992,14 +3014,14 @@
         <p:spPr bwMode="auto">
           <a:extLst>
             <a:ext uri="{909E8E84-426E-40DD-AFC4-6F175D3DCCD1}">
-              <a14:hiddenFill xmlns:a14="http://schemas.microsoft.com/office/drawing/2010/main" xmlns="">
+              <a14:hiddenFill xmlns="" xmlns:a14="http://schemas.microsoft.com/office/drawing/2010/main">
                 <a:solidFill>
                   <a:srgbClr val="FFFFFF"/>
                 </a:solidFill>
               </a14:hiddenFill>
             </a:ext>
             <a:ext uri="{91240B29-F687-4F45-9708-019B960494DF}">
-              <a14:hiddenLine xmlns:a14="http://schemas.microsoft.com/office/drawing/2010/main" xmlns="" w="9525">
+              <a14:hiddenLine xmlns="" xmlns:a14="http://schemas.microsoft.com/office/drawing/2010/main" w="9525">
                 <a:solidFill>
                   <a:srgbClr val="000000"/>
                 </a:solidFill>
@@ -3167,7 +3189,7 @@
           </a:ln>
           <a:extLst>
             <a:ext uri="{909E8E84-426E-40DD-AFC4-6F175D3DCCD1}">
-              <a14:hiddenFill xmlns:a14="http://schemas.microsoft.com/office/drawing/2010/main" xmlns="">
+              <a14:hiddenFill xmlns="" xmlns:a14="http://schemas.microsoft.com/office/drawing/2010/main">
                 <a:solidFill>
                   <a:srgbClr val="FFFFFF"/>
                 </a:solidFill>
@@ -3190,14 +3212,14 @@
           <a:noFill/>
           <a:extLst>
             <a:ext uri="{909E8E84-426E-40DD-AFC4-6F175D3DCCD1}">
-              <a14:hiddenFill xmlns:a14="http://schemas.microsoft.com/office/drawing/2010/main" xmlns="">
+              <a14:hiddenFill xmlns="" xmlns:a14="http://schemas.microsoft.com/office/drawing/2010/main">
                 <a:solidFill>
                   <a:srgbClr val="FFFFFF"/>
                 </a:solidFill>
               </a14:hiddenFill>
             </a:ext>
             <a:ext uri="{91240B29-F687-4F45-9708-019B960494DF}">
-              <a14:hiddenLine xmlns:a14="http://schemas.microsoft.com/office/drawing/2010/main" xmlns="" w="9525">
+              <a14:hiddenLine xmlns="" xmlns:a14="http://schemas.microsoft.com/office/drawing/2010/main" w="9525">
                 <a:solidFill>
                   <a:srgbClr val="000000"/>
                 </a:solidFill>
@@ -3263,14 +3285,14 @@
         <p:spPr bwMode="auto">
           <a:extLst>
             <a:ext uri="{909E8E84-426E-40DD-AFC4-6F175D3DCCD1}">
-              <a14:hiddenFill xmlns:a14="http://schemas.microsoft.com/office/drawing/2010/main" xmlns="">
+              <a14:hiddenFill xmlns="" xmlns:a14="http://schemas.microsoft.com/office/drawing/2010/main">
                 <a:solidFill>
                   <a:srgbClr val="FFFFFF"/>
                 </a:solidFill>
               </a14:hiddenFill>
             </a:ext>
             <a:ext uri="{91240B29-F687-4F45-9708-019B960494DF}">
-              <a14:hiddenLine xmlns:a14="http://schemas.microsoft.com/office/drawing/2010/main" xmlns="" w="9525">
+              <a14:hiddenLine xmlns="" xmlns:a14="http://schemas.microsoft.com/office/drawing/2010/main" w="9525">
                 <a:solidFill>
                   <a:srgbClr val="000000"/>
                 </a:solidFill>
@@ -3417,14 +3439,14 @@
         <p:spPr bwMode="auto">
           <a:extLst>
             <a:ext uri="{909E8E84-426E-40DD-AFC4-6F175D3DCCD1}">
-              <a14:hiddenFill xmlns:a14="http://schemas.microsoft.com/office/drawing/2010/main" xmlns="">
+              <a14:hiddenFill xmlns="" xmlns:a14="http://schemas.microsoft.com/office/drawing/2010/main">
                 <a:solidFill>
                   <a:srgbClr val="FFFFFF"/>
                 </a:solidFill>
               </a14:hiddenFill>
             </a:ext>
             <a:ext uri="{91240B29-F687-4F45-9708-019B960494DF}">
-              <a14:hiddenLine xmlns:a14="http://schemas.microsoft.com/office/drawing/2010/main" xmlns="" w="9525">
+              <a14:hiddenLine xmlns="" xmlns:a14="http://schemas.microsoft.com/office/drawing/2010/main" w="9525">
                 <a:solidFill>
                   <a:srgbClr val="000000"/>
                 </a:solidFill>
@@ -3571,14 +3593,14 @@
         <p:spPr bwMode="auto">
           <a:extLst>
             <a:ext uri="{909E8E84-426E-40DD-AFC4-6F175D3DCCD1}">
-              <a14:hiddenFill xmlns:a14="http://schemas.microsoft.com/office/drawing/2010/main" xmlns="">
+              <a14:hiddenFill xmlns="" xmlns:a14="http://schemas.microsoft.com/office/drawing/2010/main">
                 <a:solidFill>
                   <a:srgbClr val="FFFFFF"/>
                 </a:solidFill>
               </a14:hiddenFill>
             </a:ext>
             <a:ext uri="{91240B29-F687-4F45-9708-019B960494DF}">
-              <a14:hiddenLine xmlns:a14="http://schemas.microsoft.com/office/drawing/2010/main" xmlns="" w="9525">
+              <a14:hiddenLine xmlns="" xmlns:a14="http://schemas.microsoft.com/office/drawing/2010/main" w="9525">
                 <a:solidFill>
                   <a:srgbClr val="000000"/>
                 </a:solidFill>
@@ -3725,14 +3747,14 @@
         <p:spPr bwMode="auto">
           <a:extLst>
             <a:ext uri="{909E8E84-426E-40DD-AFC4-6F175D3DCCD1}">
-              <a14:hiddenFill xmlns:a14="http://schemas.microsoft.com/office/drawing/2010/main" xmlns="">
+              <a14:hiddenFill xmlns="" xmlns:a14="http://schemas.microsoft.com/office/drawing/2010/main">
                 <a:solidFill>
                   <a:srgbClr val="FFFFFF"/>
                 </a:solidFill>
               </a14:hiddenFill>
             </a:ext>
             <a:ext uri="{91240B29-F687-4F45-9708-019B960494DF}">
-              <a14:hiddenLine xmlns:a14="http://schemas.microsoft.com/office/drawing/2010/main" xmlns="" w="9525">
+              <a14:hiddenLine xmlns="" xmlns:a14="http://schemas.microsoft.com/office/drawing/2010/main" w="9525">
                 <a:solidFill>
                   <a:srgbClr val="000000"/>
                 </a:solidFill>
@@ -3900,7 +3922,7 @@
           </a:ln>
           <a:extLst>
             <a:ext uri="{909E8E84-426E-40DD-AFC4-6F175D3DCCD1}">
-              <a14:hiddenFill xmlns:a14="http://schemas.microsoft.com/office/drawing/2010/main" xmlns="">
+              <a14:hiddenFill xmlns="" xmlns:a14="http://schemas.microsoft.com/office/drawing/2010/main">
                 <a:solidFill>
                   <a:srgbClr val="FFFFFF"/>
                 </a:solidFill>
@@ -3923,14 +3945,14 @@
           <a:noFill/>
           <a:extLst>
             <a:ext uri="{909E8E84-426E-40DD-AFC4-6F175D3DCCD1}">
-              <a14:hiddenFill xmlns:a14="http://schemas.microsoft.com/office/drawing/2010/main" xmlns="">
+              <a14:hiddenFill xmlns="" xmlns:a14="http://schemas.microsoft.com/office/drawing/2010/main">
                 <a:solidFill>
                   <a:srgbClr val="FFFFFF"/>
                 </a:solidFill>
               </a14:hiddenFill>
             </a:ext>
             <a:ext uri="{91240B29-F687-4F45-9708-019B960494DF}">
-              <a14:hiddenLine xmlns:a14="http://schemas.microsoft.com/office/drawing/2010/main" xmlns="" w="9525">
+              <a14:hiddenLine xmlns="" xmlns:a14="http://schemas.microsoft.com/office/drawing/2010/main" w="9525">
                 <a:solidFill>
                   <a:srgbClr val="000000"/>
                 </a:solidFill>
@@ -3995,7 +4017,7 @@
           <a:blip r:embed="rId2" cstate="print">
             <a:extLst>
               <a:ext uri="{28A0092B-C50C-407E-A947-70E740481C1C}">
-                <a14:useLocalDpi xmlns:a14="http://schemas.microsoft.com/office/drawing/2010/main" xmlns="" val="0"/>
+                <a14:useLocalDpi xmlns="" xmlns:a14="http://schemas.microsoft.com/office/drawing/2010/main" val="0"/>
               </a:ext>
             </a:extLst>
           </a:blip>
@@ -4019,14 +4041,14 @@
           <a:effectLst/>
           <a:extLst>
             <a:ext uri="{909E8E84-426E-40DD-AFC4-6F175D3DCCD1}">
-              <a14:hiddenFill xmlns:a14="http://schemas.microsoft.com/office/drawing/2010/main" xmlns="">
+              <a14:hiddenFill xmlns="" xmlns:a14="http://schemas.microsoft.com/office/drawing/2010/main">
                 <a:solidFill>
                   <a:schemeClr val="accent1"/>
                 </a:solidFill>
               </a14:hiddenFill>
             </a:ext>
             <a:ext uri="{91240B29-F687-4F45-9708-019B960494DF}">
-              <a14:hiddenLine xmlns:a14="http://schemas.microsoft.com/office/drawing/2010/main" xmlns="" w="12700" algn="ctr">
+              <a14:hiddenLine xmlns="" xmlns:a14="http://schemas.microsoft.com/office/drawing/2010/main" w="12700" algn="ctr">
                 <a:solidFill>
                   <a:schemeClr val="tx1"/>
                 </a:solidFill>
@@ -4036,7 +4058,7 @@
               </a14:hiddenLine>
             </a:ext>
             <a:ext uri="{AF507438-7753-43E0-B8FC-AC1667EBCBE1}">
-              <a14:hiddenEffects xmlns:a14="http://schemas.microsoft.com/office/drawing/2010/main" xmlns="">
+              <a14:hiddenEffects xmlns="" xmlns:a14="http://schemas.microsoft.com/office/drawing/2010/main">
                 <a:effectLst>
                   <a:outerShdw dist="35921" dir="2700000" algn="ctr" rotWithShape="0">
                     <a:schemeClr val="bg2"/>
@@ -4077,7 +4099,7 @@
             <a:blip r:embed="rId4" cstate="print">
               <a:extLst>
                 <a:ext uri="{28A0092B-C50C-407E-A947-70E740481C1C}">
-                  <a14:useLocalDpi xmlns:a14="http://schemas.microsoft.com/office/drawing/2010/main" xmlns="" val="0"/>
+                  <a14:useLocalDpi xmlns="" xmlns:a14="http://schemas.microsoft.com/office/drawing/2010/main" val="0"/>
                 </a:ext>
               </a:extLst>
             </a:blip>
@@ -4100,14 +4122,14 @@
             </a:ln>
             <a:extLst>
               <a:ext uri="{909E8E84-426E-40DD-AFC4-6F175D3DCCD1}">
-                <a14:hiddenFill xmlns:a14="http://schemas.microsoft.com/office/drawing/2010/main" xmlns="">
+                <a14:hiddenFill xmlns="" xmlns:a14="http://schemas.microsoft.com/office/drawing/2010/main">
                   <a:solidFill>
                     <a:srgbClr val="FFFFFF"/>
                   </a:solidFill>
                 </a14:hiddenFill>
               </a:ext>
               <a:ext uri="{91240B29-F687-4F45-9708-019B960494DF}">
-                <a14:hiddenLine xmlns:a14="http://schemas.microsoft.com/office/drawing/2010/main" xmlns="" w="9525">
+                <a14:hiddenLine xmlns="" xmlns:a14="http://schemas.microsoft.com/office/drawing/2010/main" w="9525">
                   <a:solidFill>
                     <a:srgbClr val="000000"/>
                   </a:solidFill>
@@ -4141,14 +4163,14 @@
             </a:ln>
             <a:extLst>
               <a:ext uri="{909E8E84-426E-40DD-AFC4-6F175D3DCCD1}">
-                <a14:hiddenFill xmlns:a14="http://schemas.microsoft.com/office/drawing/2010/main" xmlns="">
+                <a14:hiddenFill xmlns="" xmlns:a14="http://schemas.microsoft.com/office/drawing/2010/main">
                   <a:solidFill>
                     <a:srgbClr val="FFFFFF"/>
                   </a:solidFill>
                 </a14:hiddenFill>
               </a:ext>
               <a:ext uri="{91240B29-F687-4F45-9708-019B960494DF}">
-                <a14:hiddenLine xmlns:a14="http://schemas.microsoft.com/office/drawing/2010/main" xmlns="" w="9525">
+                <a14:hiddenLine xmlns="" xmlns:a14="http://schemas.microsoft.com/office/drawing/2010/main" w="9525">
                   <a:solidFill>
                     <a:srgbClr val="000000"/>
                   </a:solidFill>
@@ -4320,14 +4342,14 @@
           </a:ln>
           <a:extLst>
             <a:ext uri="{909E8E84-426E-40DD-AFC4-6F175D3DCCD1}">
-              <a14:hiddenFill xmlns:a14="http://schemas.microsoft.com/office/drawing/2010/main" xmlns="">
+              <a14:hiddenFill xmlns="" xmlns:a14="http://schemas.microsoft.com/office/drawing/2010/main">
                 <a:solidFill>
                   <a:srgbClr val="FFFFFF"/>
                 </a:solidFill>
               </a14:hiddenFill>
             </a:ext>
             <a:ext uri="{91240B29-F687-4F45-9708-019B960494DF}">
-              <a14:hiddenLine xmlns:a14="http://schemas.microsoft.com/office/drawing/2010/main" xmlns="" w="9525">
+              <a14:hiddenLine xmlns="" xmlns:a14="http://schemas.microsoft.com/office/drawing/2010/main" w="9525">
                 <a:solidFill>
                   <a:srgbClr val="000000"/>
                 </a:solidFill>
@@ -4631,9 +4653,10 @@
               <a:defRPr/>
             </a:pPr>
             <a:r>
-              <a:rPr lang="en-US"/>
+              <a:rPr lang="en-US" smtClean="0"/>
               <a:t>The Capstone Experience</a:t>
             </a:r>
+            <a:endParaRPr lang="en-US" dirty="0"/>
           </a:p>
         </p:txBody>
       </p:sp>
@@ -4660,9 +4683,10 @@
               <a:defRPr/>
             </a:pPr>
             <a:r>
-              <a:rPr lang="en-US"/>
-              <a:t>Team &lt;Company Name&gt; Beta Presentation</a:t>
-            </a:r>
+              <a:rPr lang="en-US" dirty="0" smtClean="0"/>
+              <a:t>Team Urban Science Beta Presentation</a:t>
+            </a:r>
+            <a:endParaRPr lang="en-US" dirty="0"/>
           </a:p>
         </p:txBody>
       </p:sp>
@@ -4702,7 +4726,7 @@
     </p:spTree>
     <p:extLst>
       <p:ext uri="{BB962C8B-B14F-4D97-AF65-F5344CB8AC3E}">
-        <p14:creationId xmlns:p14="http://schemas.microsoft.com/office/powerpoint/2010/main" xmlns="" val="2588080409"/>
+        <p14:creationId xmlns="" xmlns:p14="http://schemas.microsoft.com/office/powerpoint/2010/main" val="2588080409"/>
       </p:ext>
     </p:extLst>
   </p:cSld>
@@ -4855,9 +4879,10 @@
               <a:defRPr/>
             </a:pPr>
             <a:r>
-              <a:rPr lang="en-US"/>
+              <a:rPr lang="en-US" smtClean="0"/>
               <a:t>The Capstone Experience</a:t>
             </a:r>
+            <a:endParaRPr lang="en-US"/>
           </a:p>
         </p:txBody>
       </p:sp>
@@ -4889,9 +4914,10 @@
               <a:defRPr/>
             </a:pPr>
             <a:r>
-              <a:rPr lang="en-US"/>
-              <a:t>Team &lt;Company Name&gt; Beta Presentation</a:t>
-            </a:r>
+              <a:rPr lang="en-US" dirty="0" smtClean="0"/>
+              <a:t>Team Urban Science Beta Presentation</a:t>
+            </a:r>
+            <a:endParaRPr lang="en-US" dirty="0"/>
           </a:p>
         </p:txBody>
       </p:sp>
@@ -4931,7 +4957,7 @@
     </p:spTree>
     <p:extLst>
       <p:ext uri="{BB962C8B-B14F-4D97-AF65-F5344CB8AC3E}">
-        <p14:creationId xmlns:p14="http://schemas.microsoft.com/office/powerpoint/2010/main" xmlns="" val="2741523762"/>
+        <p14:creationId xmlns="" xmlns:p14="http://schemas.microsoft.com/office/powerpoint/2010/main" val="2741523762"/>
       </p:ext>
     </p:extLst>
   </p:cSld>
@@ -5078,9 +5104,10 @@
               <a:defRPr/>
             </a:pPr>
             <a:r>
-              <a:rPr lang="en-US"/>
+              <a:rPr lang="en-US" smtClean="0"/>
               <a:t>The Capstone Experience</a:t>
             </a:r>
+            <a:endParaRPr lang="en-US"/>
           </a:p>
         </p:txBody>
       </p:sp>
@@ -5112,8 +5139,16 @@
               <a:defRPr/>
             </a:pPr>
             <a:r>
-              <a:rPr lang="en-US"/>
-              <a:t>Team &lt;Company Name&gt; Beta Presentation</a:t>
+              <a:rPr lang="en-US" dirty="0"/>
+              <a:t>Team </a:t>
+            </a:r>
+            <a:r>
+              <a:rPr lang="en-US" dirty="0" smtClean="0"/>
+              <a:t>Urban Science </a:t>
+            </a:r>
+            <a:r>
+              <a:rPr lang="en-US" dirty="0"/>
+              <a:t>Beta Presentation</a:t>
             </a:r>
           </a:p>
         </p:txBody>
@@ -5154,7 +5189,7 @@
     </p:spTree>
     <p:extLst>
       <p:ext uri="{BB962C8B-B14F-4D97-AF65-F5344CB8AC3E}">
-        <p14:creationId xmlns:p14="http://schemas.microsoft.com/office/powerpoint/2010/main" xmlns="" val="2682078689"/>
+        <p14:creationId xmlns="" xmlns:p14="http://schemas.microsoft.com/office/powerpoint/2010/main" val="2682078689"/>
       </p:ext>
     </p:extLst>
   </p:cSld>
@@ -5419,9 +5454,10 @@
               <a:defRPr/>
             </a:pPr>
             <a:r>
-              <a:rPr lang="en-US"/>
+              <a:rPr lang="en-US" smtClean="0"/>
               <a:t>The Capstone Experience</a:t>
             </a:r>
+            <a:endParaRPr lang="en-US"/>
           </a:p>
         </p:txBody>
       </p:sp>
@@ -5448,8 +5484,16 @@
               <a:defRPr/>
             </a:pPr>
             <a:r>
-              <a:rPr lang="en-US"/>
-              <a:t>Team &lt;Company Name&gt; Beta Presentation</a:t>
+              <a:rPr lang="en-US" dirty="0"/>
+              <a:t>Team </a:t>
+            </a:r>
+            <a:r>
+              <a:rPr lang="en-US" dirty="0" smtClean="0"/>
+              <a:t>Urban Science Beta </a:t>
+            </a:r>
+            <a:r>
+              <a:rPr lang="en-US" dirty="0"/>
+              <a:t>Presentation</a:t>
             </a:r>
           </a:p>
         </p:txBody>
@@ -5490,7 +5534,7 @@
     </p:spTree>
     <p:extLst>
       <p:ext uri="{BB962C8B-B14F-4D97-AF65-F5344CB8AC3E}">
-        <p14:creationId xmlns:p14="http://schemas.microsoft.com/office/powerpoint/2010/main" xmlns="" val="1967580509"/>
+        <p14:creationId xmlns="" xmlns:p14="http://schemas.microsoft.com/office/powerpoint/2010/main" val="1967580509"/>
       </p:ext>
     </p:extLst>
   </p:cSld>
@@ -5875,9 +5919,10 @@
               <a:defRPr/>
             </a:pPr>
             <a:r>
-              <a:rPr lang="en-US"/>
+              <a:rPr lang="en-US" smtClean="0"/>
               <a:t>The Capstone Experience</a:t>
             </a:r>
+            <a:endParaRPr lang="en-US"/>
           </a:p>
         </p:txBody>
       </p:sp>
@@ -5904,8 +5949,16 @@
               <a:defRPr/>
             </a:pPr>
             <a:r>
-              <a:rPr lang="en-US"/>
-              <a:t>Team &lt;Company Name&gt; Beta Presentation</a:t>
+              <a:rPr lang="en-US" dirty="0"/>
+              <a:t>Team </a:t>
+            </a:r>
+            <a:r>
+              <a:rPr lang="en-US" dirty="0" smtClean="0"/>
+              <a:t>Urban Science Beta </a:t>
+            </a:r>
+            <a:r>
+              <a:rPr lang="en-US" dirty="0"/>
+              <a:t>Presentation</a:t>
             </a:r>
           </a:p>
         </p:txBody>
@@ -5946,7 +5999,7 @@
     </p:spTree>
     <p:extLst>
       <p:ext uri="{BB962C8B-B14F-4D97-AF65-F5344CB8AC3E}">
-        <p14:creationId xmlns:p14="http://schemas.microsoft.com/office/powerpoint/2010/main" xmlns="" val="4110782242"/>
+        <p14:creationId xmlns="" xmlns:p14="http://schemas.microsoft.com/office/powerpoint/2010/main" val="4110782242"/>
       </p:ext>
     </p:extLst>
   </p:cSld>
@@ -6019,7 +6072,7 @@
               <a:defRPr/>
             </a:pPr>
             <a:r>
-              <a:rPr lang="en-US"/>
+              <a:rPr lang="en-US" smtClean="0"/>
               <a:t>The Capstone Experience</a:t>
             </a:r>
             <a:endParaRPr lang="en-US" dirty="0"/>
@@ -6054,10 +6107,17 @@
               <a:defRPr/>
             </a:pPr>
             <a:r>
-              <a:rPr lang="en-US"/>
-              <a:t>Team &lt;Company Name&gt; Beta Presentation</a:t>
-            </a:r>
-            <a:endParaRPr lang="en-US" dirty="0"/>
+              <a:rPr lang="en-US" dirty="0"/>
+              <a:t>Team </a:t>
+            </a:r>
+            <a:r>
+              <a:rPr lang="en-US" dirty="0" smtClean="0"/>
+              <a:t>Urban Science </a:t>
+            </a:r>
+            <a:r>
+              <a:rPr lang="en-US" dirty="0"/>
+              <a:t>Beta Presentation</a:t>
+            </a:r>
           </a:p>
         </p:txBody>
       </p:sp>
@@ -6097,7 +6157,7 @@
     </p:spTree>
     <p:extLst>
       <p:ext uri="{BB962C8B-B14F-4D97-AF65-F5344CB8AC3E}">
-        <p14:creationId xmlns:p14="http://schemas.microsoft.com/office/powerpoint/2010/main" xmlns="" val="1892974325"/>
+        <p14:creationId xmlns="" xmlns:p14="http://schemas.microsoft.com/office/powerpoint/2010/main" val="1892974325"/>
       </p:ext>
     </p:extLst>
   </p:cSld>
@@ -6147,9 +6207,10 @@
               <a:defRPr/>
             </a:pPr>
             <a:r>
-              <a:rPr lang="en-US"/>
+              <a:rPr lang="en-US" smtClean="0"/>
               <a:t>The Capstone Experience</a:t>
             </a:r>
+            <a:endParaRPr lang="en-US"/>
           </a:p>
         </p:txBody>
       </p:sp>
@@ -6176,8 +6237,16 @@
               <a:defRPr/>
             </a:pPr>
             <a:r>
-              <a:rPr lang="en-US"/>
-              <a:t>Team &lt;Company Name&gt; Beta Presentation</a:t>
+              <a:rPr lang="en-US" dirty="0"/>
+              <a:t>Team </a:t>
+            </a:r>
+            <a:r>
+              <a:rPr lang="en-US" dirty="0" smtClean="0"/>
+              <a:t>Urban Science </a:t>
+            </a:r>
+            <a:r>
+              <a:rPr lang="en-US" dirty="0"/>
+              <a:t>Beta Presentation</a:t>
             </a:r>
           </a:p>
         </p:txBody>
@@ -6218,7 +6287,7 @@
     </p:spTree>
     <p:extLst>
       <p:ext uri="{BB962C8B-B14F-4D97-AF65-F5344CB8AC3E}">
-        <p14:creationId xmlns:p14="http://schemas.microsoft.com/office/powerpoint/2010/main" xmlns="" val="606310080"/>
+        <p14:creationId xmlns="" xmlns:p14="http://schemas.microsoft.com/office/powerpoint/2010/main" val="606310080"/>
       </p:ext>
     </p:extLst>
   </p:cSld>
@@ -6259,7 +6328,7 @@
           <a:blip r:embed="rId3" cstate="print">
             <a:extLst>
               <a:ext uri="{28A0092B-C50C-407E-A947-70E740481C1C}">
-                <a14:useLocalDpi xmlns:a14="http://schemas.microsoft.com/office/drawing/2010/main" xmlns="" val="0"/>
+                <a14:useLocalDpi xmlns="" xmlns:a14="http://schemas.microsoft.com/office/drawing/2010/main" val="0"/>
               </a:ext>
             </a:extLst>
           </a:blip>
@@ -6282,14 +6351,14 @@
           </a:ln>
           <a:extLst>
             <a:ext uri="{909E8E84-426E-40DD-AFC4-6F175D3DCCD1}">
-              <a14:hiddenFill xmlns:a14="http://schemas.microsoft.com/office/drawing/2010/main" xmlns="">
+              <a14:hiddenFill xmlns="" xmlns:a14="http://schemas.microsoft.com/office/drawing/2010/main">
                 <a:solidFill>
                   <a:srgbClr val="FFFFFF"/>
                 </a:solidFill>
               </a14:hiddenFill>
             </a:ext>
             <a:ext uri="{91240B29-F687-4F45-9708-019B960494DF}">
-              <a14:hiddenLine xmlns:a14="http://schemas.microsoft.com/office/drawing/2010/main" xmlns="" w="9525">
+              <a14:hiddenLine xmlns="" xmlns:a14="http://schemas.microsoft.com/office/drawing/2010/main" w="9525">
                 <a:solidFill>
                   <a:srgbClr val="000000"/>
                 </a:solidFill>
@@ -6450,7 +6519,7 @@
     </p:spTree>
     <p:extLst>
       <p:ext uri="{BB962C8B-B14F-4D97-AF65-F5344CB8AC3E}">
-        <p14:creationId xmlns:p14="http://schemas.microsoft.com/office/powerpoint/2010/main" xmlns="" val="1504093363"/>
+        <p14:creationId xmlns="" xmlns:p14="http://schemas.microsoft.com/office/powerpoint/2010/main" val="1504093363"/>
       </p:ext>
     </p:extLst>
   </p:cSld>
@@ -6511,14 +6580,14 @@
           </a:ln>
           <a:extLst>
             <a:ext uri="{909E8E84-426E-40DD-AFC4-6F175D3DCCD1}">
-              <a14:hiddenFill xmlns:a14="http://schemas.microsoft.com/office/drawing/2010/main" xmlns="">
+              <a14:hiddenFill xmlns="" xmlns:a14="http://schemas.microsoft.com/office/drawing/2010/main">
                 <a:solidFill>
                   <a:srgbClr val="FFFFFF"/>
                 </a:solidFill>
               </a14:hiddenFill>
             </a:ext>
             <a:ext uri="{91240B29-F687-4F45-9708-019B960494DF}">
-              <a14:hiddenLine xmlns:a14="http://schemas.microsoft.com/office/drawing/2010/main" xmlns="" w="9525">
+              <a14:hiddenLine xmlns="" xmlns:a14="http://schemas.microsoft.com/office/drawing/2010/main" w="9525">
                 <a:solidFill>
                   <a:srgbClr val="000000"/>
                 </a:solidFill>
@@ -6569,14 +6638,14 @@
           </a:ln>
           <a:extLst>
             <a:ext uri="{909E8E84-426E-40DD-AFC4-6F175D3DCCD1}">
-              <a14:hiddenFill xmlns:a14="http://schemas.microsoft.com/office/drawing/2010/main" xmlns="">
+              <a14:hiddenFill xmlns="" xmlns:a14="http://schemas.microsoft.com/office/drawing/2010/main">
                 <a:solidFill>
                   <a:srgbClr val="FFFFFF"/>
                 </a:solidFill>
               </a14:hiddenFill>
             </a:ext>
             <a:ext uri="{91240B29-F687-4F45-9708-019B960494DF}">
-              <a14:hiddenLine xmlns:a14="http://schemas.microsoft.com/office/drawing/2010/main" xmlns="" w="9525">
+              <a14:hiddenLine xmlns="" xmlns:a14="http://schemas.microsoft.com/office/drawing/2010/main" w="9525">
                 <a:solidFill>
                   <a:srgbClr val="000000"/>
                 </a:solidFill>
@@ -6676,9 +6745,10 @@
               <a:defRPr/>
             </a:pPr>
             <a:r>
-              <a:rPr lang="en-US"/>
+              <a:rPr lang="en-US" smtClean="0"/>
               <a:t>The Capstone Experience</a:t>
             </a:r>
+            <a:endParaRPr lang="en-US"/>
           </a:p>
         </p:txBody>
       </p:sp>
@@ -6727,10 +6797,17 @@
               <a:defRPr/>
             </a:pPr>
             <a:r>
-              <a:rPr lang="en-US"/>
-              <a:t>Team &lt;Company Name&gt; Beta Presentation</a:t>
-            </a:r>
-            <a:endParaRPr lang="en-US" dirty="0"/>
+              <a:rPr lang="en-US" dirty="0"/>
+              <a:t>Team </a:t>
+            </a:r>
+            <a:r>
+              <a:rPr lang="en-US" dirty="0" smtClean="0"/>
+              <a:t>Urban Science Beta </a:t>
+            </a:r>
+            <a:r>
+              <a:rPr lang="en-US" dirty="0"/>
+              <a:t>Presentation</a:t>
+            </a:r>
           </a:p>
         </p:txBody>
       </p:sp>
@@ -6913,7 +6990,7 @@
           <a:blip r:embed="rId11" cstate="print">
             <a:extLst>
               <a:ext uri="{28A0092B-C50C-407E-A947-70E740481C1C}">
-                <a14:useLocalDpi xmlns:a14="http://schemas.microsoft.com/office/drawing/2010/main" xmlns="" val="0"/>
+                <a14:useLocalDpi xmlns="" xmlns:a14="http://schemas.microsoft.com/office/drawing/2010/main" val="0"/>
               </a:ext>
             </a:extLst>
           </a:blip>
@@ -6936,14 +7013,14 @@
           </a:ln>
           <a:extLst>
             <a:ext uri="{909E8E84-426E-40DD-AFC4-6F175D3DCCD1}">
-              <a14:hiddenFill xmlns:a14="http://schemas.microsoft.com/office/drawing/2010/main" xmlns="">
+              <a14:hiddenFill xmlns="" xmlns:a14="http://schemas.microsoft.com/office/drawing/2010/main">
                 <a:solidFill>
                   <a:srgbClr val="FFFFFF"/>
                 </a:solidFill>
               </a14:hiddenFill>
             </a:ext>
             <a:ext uri="{91240B29-F687-4F45-9708-019B960494DF}">
-              <a14:hiddenLine xmlns:a14="http://schemas.microsoft.com/office/drawing/2010/main" xmlns="" w="9525">
+              <a14:hiddenLine xmlns="" xmlns:a14="http://schemas.microsoft.com/office/drawing/2010/main" w="9525">
                 <a:solidFill>
                   <a:srgbClr val="000000"/>
                 </a:solidFill>
@@ -7684,7 +7761,11 @@
             </a:pPr>
             <a:r>
               <a:rPr lang="en-US" dirty="0" smtClean="0"/>
-              <a:t>Throughout the PowerPoint template, replace placeholders &lt;…&gt; with the appropriate information.</a:t>
+              <a:t>Throughout </a:t>
+            </a:r>
+            <a:r>
+              <a:rPr lang="en-US" dirty="0" smtClean="0"/>
+              <a:t>the PowerPoint template, replace placeholders &lt;…&gt; with the appropriate information.</a:t>
             </a:r>
           </a:p>
           <a:p>
@@ -7756,9 +7837,10 @@
               <a:defRPr/>
             </a:pPr>
             <a:r>
-              <a:rPr lang="en-US"/>
+              <a:rPr lang="en-US" smtClean="0"/>
               <a:t>The Capstone Experience</a:t>
             </a:r>
+            <a:endParaRPr lang="en-US"/>
           </a:p>
         </p:txBody>
       </p:sp>
@@ -7781,8 +7863,16 @@
               <a:defRPr/>
             </a:pPr>
             <a:r>
-              <a:rPr lang="en-US"/>
-              <a:t>Team &lt;Company Name&gt; Beta Presentation</a:t>
+              <a:rPr lang="en-US" dirty="0"/>
+              <a:t>Team </a:t>
+            </a:r>
+            <a:r>
+              <a:rPr lang="en-US" dirty="0" smtClean="0"/>
+              <a:t>Urban Science </a:t>
+            </a:r>
+            <a:r>
+              <a:rPr lang="en-US" dirty="0"/>
+              <a:t>Beta Presentation</a:t>
             </a:r>
           </a:p>
         </p:txBody>
@@ -7891,19 +7981,60 @@
               <a:rPr lang="en-US" dirty="0" smtClean="0"/>
               <a:t>Bug Fix </a:t>
             </a:r>
+            <a:r>
+              <a:rPr lang="en-US" dirty="0" smtClean="0"/>
+              <a:t>everything</a:t>
+            </a:r>
             <a:endParaRPr lang="en-US" dirty="0" smtClean="0"/>
           </a:p>
           <a:p>
             <a:pPr eaLnBrk="1" hangingPunct="1"/>
             <a:r>
               <a:rPr lang="en-US" dirty="0" smtClean="0"/>
-              <a:t>Mysterious February bug</a:t>
+              <a:t>Mysterious </a:t>
+            </a:r>
+            <a:r>
+              <a:rPr lang="en-US" dirty="0" err="1" smtClean="0"/>
+              <a:t>Javascript</a:t>
+            </a:r>
+            <a:r>
+              <a:rPr lang="en-US" dirty="0" smtClean="0"/>
+              <a:t> bugs</a:t>
+            </a:r>
+          </a:p>
+          <a:p>
+            <a:pPr eaLnBrk="1" hangingPunct="1"/>
+            <a:r>
+              <a:rPr lang="en-US" dirty="0" smtClean="0"/>
+              <a:t>Documentation of code</a:t>
+            </a:r>
+          </a:p>
+          <a:p>
+            <a:pPr eaLnBrk="1" hangingPunct="1"/>
+            <a:r>
+              <a:rPr lang="en-US" dirty="0" smtClean="0"/>
+              <a:t>Project Video</a:t>
+            </a:r>
+          </a:p>
+          <a:p>
+            <a:pPr eaLnBrk="1" hangingPunct="1"/>
+            <a:r>
+              <a:rPr lang="en-US" dirty="0" smtClean="0"/>
+              <a:t>Project </a:t>
+            </a:r>
+            <a:r>
+              <a:rPr lang="en-US" smtClean="0"/>
+              <a:t>Plan Document</a:t>
             </a:r>
           </a:p>
           <a:p>
             <a:pPr eaLnBrk="1" hangingPunct="1"/>
             <a:endParaRPr lang="en-US" dirty="0" smtClean="0"/>
           </a:p>
+          <a:p>
+            <a:pPr eaLnBrk="1" hangingPunct="1"/>
+            <a:endParaRPr lang="en-US" dirty="0" smtClean="0"/>
+          </a:p>
         </p:txBody>
       </p:sp>
       <p:sp>
@@ -7925,9 +8056,10 @@
               <a:defRPr/>
             </a:pPr>
             <a:r>
-              <a:rPr lang="en-US"/>
+              <a:rPr lang="en-US" smtClean="0"/>
               <a:t>The Capstone Experience</a:t>
             </a:r>
+            <a:endParaRPr lang="en-US"/>
           </a:p>
         </p:txBody>
       </p:sp>
@@ -7950,8 +8082,16 @@
               <a:defRPr/>
             </a:pPr>
             <a:r>
-              <a:rPr lang="en-US"/>
-              <a:t>Team &lt;Company Name&gt; Beta Presentation</a:t>
+              <a:rPr lang="en-US" dirty="0"/>
+              <a:t>Team </a:t>
+            </a:r>
+            <a:r>
+              <a:rPr lang="en-US" dirty="0" smtClean="0"/>
+              <a:t>Urban Science </a:t>
+            </a:r>
+            <a:r>
+              <a:rPr lang="en-US" dirty="0"/>
+              <a:t>Beta Presentation</a:t>
             </a:r>
           </a:p>
         </p:txBody>
@@ -8267,9 +8407,10 @@
               <a:defRPr/>
             </a:pPr>
             <a:r>
-              <a:rPr lang="en-US"/>
+              <a:rPr lang="en-US" smtClean="0"/>
               <a:t>The Capstone Experience</a:t>
             </a:r>
+            <a:endParaRPr lang="en-US"/>
           </a:p>
         </p:txBody>
       </p:sp>
@@ -8292,8 +8433,16 @@
               <a:defRPr/>
             </a:pPr>
             <a:r>
-              <a:rPr lang="en-US"/>
-              <a:t>Team &lt;Company Name&gt; Beta Presentation</a:t>
+              <a:rPr lang="en-US" dirty="0"/>
+              <a:t>Team </a:t>
+            </a:r>
+            <a:r>
+              <a:rPr lang="en-US" dirty="0" smtClean="0"/>
+              <a:t>Urban Science </a:t>
+            </a:r>
+            <a:r>
+              <a:rPr lang="en-US" dirty="0"/>
+              <a:t>Beta Presentation</a:t>
             </a:r>
           </a:p>
         </p:txBody>
@@ -8395,7 +8544,6 @@
               <a:rPr lang="en-US" sz="3600" dirty="0" smtClean="0"/>
               <a:t> Generator</a:t>
             </a:r>
-            <a:endParaRPr lang="en-US" sz="3600" dirty="0" smtClean="0"/>
           </a:p>
         </p:txBody>
       </p:sp>
@@ -8430,21 +8578,8 @@
                   <a:srgbClr val="18453B"/>
                 </a:solidFill>
               </a:rPr>
-              <a:t>Team </a:t>
-            </a:r>
-            <a:r>
-              <a:rPr lang="en-US" sz="2400" dirty="0" smtClean="0">
-                <a:solidFill>
-                  <a:srgbClr val="18453B"/>
-                </a:solidFill>
-              </a:rPr>
-              <a:t>Urban Science</a:t>
-            </a:r>
-            <a:endParaRPr lang="en-US" sz="2400" dirty="0" smtClean="0">
-              <a:solidFill>
-                <a:srgbClr val="18453B"/>
-              </a:solidFill>
-            </a:endParaRPr>
+              <a:t>Team Urban Science</a:t>
+            </a:r>
           </a:p>
           <a:p>
             <a:pPr eaLnBrk="1" hangingPunct="1">
@@ -8460,11 +8595,6 @@
               </a:rPr>
               <a:t>Peter Chen</a:t>
             </a:r>
-            <a:endParaRPr lang="en-US" dirty="0" smtClean="0">
-              <a:solidFill>
-                <a:srgbClr val="18453B"/>
-              </a:solidFill>
-            </a:endParaRPr>
           </a:p>
           <a:p>
             <a:pPr eaLnBrk="1" hangingPunct="1">
@@ -8493,21 +8623,8 @@
                   <a:srgbClr val="18453B"/>
                 </a:solidFill>
               </a:rPr>
-              <a:t>Louis </a:t>
-            </a:r>
-            <a:r>
-              <a:rPr lang="en-US" dirty="0" smtClean="0">
-                <a:solidFill>
-                  <a:srgbClr val="18453B"/>
-                </a:solidFill>
-              </a:rPr>
-              <a:t>Bodnar</a:t>
-            </a:r>
-            <a:endParaRPr lang="en-US" dirty="0" smtClean="0">
-              <a:solidFill>
-                <a:srgbClr val="18453B"/>
-              </a:solidFill>
-            </a:endParaRPr>
+              <a:t>Louis Bodnar</a:t>
+            </a:r>
           </a:p>
           <a:p>
             <a:pPr eaLnBrk="1" hangingPunct="1">
@@ -8523,11 +8640,6 @@
               </a:rPr>
               <a:t>Kevin Shreve</a:t>
             </a:r>
-            <a:endParaRPr lang="en-US" dirty="0" smtClean="0">
-              <a:solidFill>
-                <a:srgbClr val="18453B"/>
-              </a:solidFill>
-            </a:endParaRPr>
           </a:p>
           <a:p>
             <a:pPr eaLnBrk="1" hangingPunct="1">
@@ -8693,9 +8805,10 @@
               <a:defRPr/>
             </a:pPr>
             <a:r>
-              <a:rPr lang="en-US"/>
+              <a:rPr lang="en-US" smtClean="0"/>
               <a:t>The Capstone Experience</a:t>
             </a:r>
+            <a:endParaRPr lang="en-US"/>
           </a:p>
         </p:txBody>
       </p:sp>
@@ -8718,8 +8831,12 @@
               <a:defRPr/>
             </a:pPr>
             <a:r>
-              <a:rPr lang="en-US"/>
-              <a:t>Team &lt;Company Name&gt; Beta Presentation</a:t>
+              <a:rPr lang="en-US" dirty="0" smtClean="0"/>
+              <a:t>Team Urban Science </a:t>
+            </a:r>
+            <a:r>
+              <a:rPr lang="en-US" dirty="0"/>
+              <a:t>Beta Presentation</a:t>
             </a:r>
           </a:p>
         </p:txBody>
@@ -8827,7 +8944,7 @@
               <a:defRPr/>
             </a:pPr>
             <a:r>
-              <a:rPr lang="en-US"/>
+              <a:rPr lang="en-US" smtClean="0"/>
               <a:t>The Capstone Experience</a:t>
             </a:r>
             <a:endParaRPr lang="en-US" dirty="0"/>
@@ -8853,10 +8970,17 @@
               <a:defRPr/>
             </a:pPr>
             <a:r>
-              <a:rPr lang="en-US"/>
-              <a:t>Team &lt;Company Name&gt; Beta Presentation</a:t>
-            </a:r>
-            <a:endParaRPr lang="en-US" dirty="0"/>
+              <a:rPr lang="en-US" dirty="0"/>
+              <a:t>Team </a:t>
+            </a:r>
+            <a:r>
+              <a:rPr lang="en-US" dirty="0" smtClean="0"/>
+              <a:t>Urban Science </a:t>
+            </a:r>
+            <a:r>
+              <a:rPr lang="en-US" dirty="0"/>
+              <a:t>Beta Presentation</a:t>
+            </a:r>
           </a:p>
         </p:txBody>
       </p:sp>
@@ -8990,9 +9114,10 @@
               <a:defRPr/>
             </a:pPr>
             <a:r>
-              <a:rPr lang="en-US"/>
+              <a:rPr lang="en-US" smtClean="0"/>
               <a:t>The Capstone Experience</a:t>
             </a:r>
+            <a:endParaRPr lang="en-US"/>
           </a:p>
         </p:txBody>
       </p:sp>
@@ -9015,8 +9140,16 @@
               <a:defRPr/>
             </a:pPr>
             <a:r>
-              <a:rPr lang="en-US"/>
-              <a:t>Team &lt;Company Name&gt; Beta Presentation</a:t>
+              <a:rPr lang="en-US" dirty="0"/>
+              <a:t>Team </a:t>
+            </a:r>
+            <a:r>
+              <a:rPr lang="en-US" dirty="0" smtClean="0"/>
+              <a:t>Urban Science </a:t>
+            </a:r>
+            <a:r>
+              <a:rPr lang="en-US" dirty="0"/>
+              <a:t>Beta Presentation</a:t>
             </a:r>
           </a:p>
         </p:txBody>
@@ -9129,9 +9262,10 @@
               <a:defRPr/>
             </a:pPr>
             <a:r>
-              <a:rPr lang="en-US"/>
+              <a:rPr lang="en-US" smtClean="0"/>
               <a:t>The Capstone Experience</a:t>
             </a:r>
+            <a:endParaRPr lang="en-US"/>
           </a:p>
         </p:txBody>
       </p:sp>
@@ -9154,8 +9288,16 @@
               <a:defRPr/>
             </a:pPr>
             <a:r>
-              <a:rPr lang="en-US"/>
-              <a:t>Team &lt;Company Name&gt; Beta Presentation</a:t>
+              <a:rPr lang="en-US" dirty="0"/>
+              <a:t>Team </a:t>
+            </a:r>
+            <a:r>
+              <a:rPr lang="en-US" dirty="0" smtClean="0"/>
+              <a:t>Urban Science </a:t>
+            </a:r>
+            <a:r>
+              <a:rPr lang="en-US" dirty="0"/>
+              <a:t>Beta Presentation</a:t>
             </a:r>
           </a:p>
         </p:txBody>
@@ -9268,9 +9410,10 @@
               <a:defRPr/>
             </a:pPr>
             <a:r>
-              <a:rPr lang="en-US"/>
+              <a:rPr lang="en-US" smtClean="0"/>
               <a:t>The Capstone Experience</a:t>
             </a:r>
+            <a:endParaRPr lang="en-US"/>
           </a:p>
         </p:txBody>
       </p:sp>
@@ -9293,8 +9436,16 @@
               <a:defRPr/>
             </a:pPr>
             <a:r>
-              <a:rPr lang="en-US"/>
-              <a:t>Team &lt;Company Name&gt; Beta Presentation</a:t>
+              <a:rPr lang="en-US" dirty="0"/>
+              <a:t>Team </a:t>
+            </a:r>
+            <a:r>
+              <a:rPr lang="en-US" dirty="0" smtClean="0"/>
+              <a:t>Urban Science </a:t>
+            </a:r>
+            <a:r>
+              <a:rPr lang="en-US" dirty="0"/>
+              <a:t>Beta Presentation</a:t>
             </a:r>
           </a:p>
         </p:txBody>
@@ -9333,6 +9484,13 @@
   <p:clrMapOvr>
     <a:masterClrMapping/>
   </p:clrMapOvr>
+  <p:timing>
+    <p:tnLst>
+      <p:par>
+        <p:cTn id="1" dur="indefinite" restart="never" nodeType="tmRoot"/>
+      </p:par>
+    </p:tnLst>
+  </p:timing>
 </p:sld>
 </file>
 
@@ -9400,9 +9558,10 @@
               <a:defRPr/>
             </a:pPr>
             <a:r>
-              <a:rPr lang="en-US"/>
+              <a:rPr lang="en-US" smtClean="0"/>
               <a:t>The Capstone Experience</a:t>
             </a:r>
+            <a:endParaRPr lang="en-US"/>
           </a:p>
         </p:txBody>
       </p:sp>
@@ -9425,8 +9584,16 @@
               <a:defRPr/>
             </a:pPr>
             <a:r>
-              <a:rPr lang="en-US"/>
-              <a:t>Team &lt;Company Name&gt; Beta Presentation</a:t>
+              <a:rPr lang="en-US" dirty="0"/>
+              <a:t>Team </a:t>
+            </a:r>
+            <a:r>
+              <a:rPr lang="en-US" dirty="0" smtClean="0"/>
+              <a:t>Urban Science </a:t>
+            </a:r>
+            <a:r>
+              <a:rPr lang="en-US" dirty="0"/>
+              <a:t>Beta Presentation</a:t>
             </a:r>
           </a:p>
         </p:txBody>
@@ -9465,6 +9632,13 @@
   <p:clrMapOvr>
     <a:masterClrMapping/>
   </p:clrMapOvr>
+  <p:timing>
+    <p:tnLst>
+      <p:par>
+        <p:cTn id="1" dur="indefinite" restart="never" nodeType="tmRoot"/>
+      </p:par>
+    </p:tnLst>
+  </p:timing>
 </p:sld>
 </file>
 

</xml_diff>

<commit_message>
added another bug for pres
</commit_message>
<xml_diff>
--- a/documents/presentations/beta-presentation/team-urban-science-beta-presentation.pptx
+++ b/documents/presentations/beta-presentation/team-urban-science-beta-presentation.pptx
@@ -400,7 +400,7 @@
           <a:blip r:embed="rId2" cstate="print">
             <a:extLst>
               <a:ext uri="{28A0092B-C50C-407E-A947-70E740481C1C}">
-                <a14:useLocalDpi xmlns="" xmlns:a14="http://schemas.microsoft.com/office/drawing/2010/main" val="0"/>
+                <a14:useLocalDpi xmlns:a14="http://schemas.microsoft.com/office/drawing/2010/main" xmlns="" val="0"/>
               </a:ext>
             </a:extLst>
           </a:blip>
@@ -423,14 +423,14 @@
           </a:ln>
           <a:extLst>
             <a:ext uri="{909E8E84-426E-40DD-AFC4-6F175D3DCCD1}">
-              <a14:hiddenFill xmlns="" xmlns:a14="http://schemas.microsoft.com/office/drawing/2010/main">
+              <a14:hiddenFill xmlns:a14="http://schemas.microsoft.com/office/drawing/2010/main" xmlns="">
                 <a:solidFill>
                   <a:srgbClr val="FFFFFF"/>
                 </a:solidFill>
               </a14:hiddenFill>
             </a:ext>
             <a:ext uri="{91240B29-F687-4F45-9708-019B960494DF}">
-              <a14:hiddenLine xmlns="" xmlns:a14="http://schemas.microsoft.com/office/drawing/2010/main" w="9525">
+              <a14:hiddenLine xmlns:a14="http://schemas.microsoft.com/office/drawing/2010/main" xmlns="" w="9525">
                 <a:solidFill>
                   <a:srgbClr val="000000"/>
                 </a:solidFill>
@@ -464,14 +464,14 @@
           </a:ln>
           <a:extLst>
             <a:ext uri="{909E8E84-426E-40DD-AFC4-6F175D3DCCD1}">
-              <a14:hiddenFill xmlns="" xmlns:a14="http://schemas.microsoft.com/office/drawing/2010/main">
+              <a14:hiddenFill xmlns:a14="http://schemas.microsoft.com/office/drawing/2010/main" xmlns="">
                 <a:solidFill>
                   <a:srgbClr val="FFFFFF"/>
                 </a:solidFill>
               </a14:hiddenFill>
             </a:ext>
             <a:ext uri="{91240B29-F687-4F45-9708-019B960494DF}">
-              <a14:hiddenLine xmlns="" xmlns:a14="http://schemas.microsoft.com/office/drawing/2010/main" w="9525">
+              <a14:hiddenLine xmlns:a14="http://schemas.microsoft.com/office/drawing/2010/main" xmlns="" w="9525">
                 <a:solidFill>
                   <a:srgbClr val="000000"/>
                 </a:solidFill>
@@ -605,7 +605,7 @@
     </p:spTree>
     <p:extLst>
       <p:ext uri="{BB962C8B-B14F-4D97-AF65-F5344CB8AC3E}">
-        <p14:creationId xmlns="" xmlns:p14="http://schemas.microsoft.com/office/powerpoint/2010/main" val="232417806"/>
+        <p14:creationId xmlns:p14="http://schemas.microsoft.com/office/powerpoint/2010/main" xmlns="" val="232417806"/>
       </p:ext>
     </p:extLst>
   </p:cSld>
@@ -931,7 +931,7 @@
     </p:spTree>
     <p:extLst>
       <p:ext uri="{BB962C8B-B14F-4D97-AF65-F5344CB8AC3E}">
-        <p14:creationId xmlns="" xmlns:p14="http://schemas.microsoft.com/office/powerpoint/2010/main" val="2158654164"/>
+        <p14:creationId xmlns:p14="http://schemas.microsoft.com/office/powerpoint/2010/main" xmlns="" val="2158654164"/>
       </p:ext>
     </p:extLst>
   </p:cSld>
@@ -1101,7 +1101,7 @@
           </a:ln>
           <a:extLst>
             <a:ext uri="{909E8E84-426E-40DD-AFC4-6F175D3DCCD1}">
-              <a14:hiddenFill xmlns="" xmlns:a14="http://schemas.microsoft.com/office/drawing/2010/main">
+              <a14:hiddenFill xmlns:a14="http://schemas.microsoft.com/office/drawing/2010/main" xmlns="">
                 <a:solidFill>
                   <a:srgbClr val="FFFFFF"/>
                 </a:solidFill>
@@ -1124,14 +1124,14 @@
           <a:noFill/>
           <a:extLst>
             <a:ext uri="{909E8E84-426E-40DD-AFC4-6F175D3DCCD1}">
-              <a14:hiddenFill xmlns="" xmlns:a14="http://schemas.microsoft.com/office/drawing/2010/main">
+              <a14:hiddenFill xmlns:a14="http://schemas.microsoft.com/office/drawing/2010/main" xmlns="">
                 <a:solidFill>
                   <a:srgbClr val="FFFFFF"/>
                 </a:solidFill>
               </a14:hiddenFill>
             </a:ext>
             <a:ext uri="{91240B29-F687-4F45-9708-019B960494DF}">
-              <a14:hiddenLine xmlns="" xmlns:a14="http://schemas.microsoft.com/office/drawing/2010/main" w="9525">
+              <a14:hiddenLine xmlns:a14="http://schemas.microsoft.com/office/drawing/2010/main" xmlns="" w="9525">
                 <a:solidFill>
                   <a:srgbClr val="000000"/>
                 </a:solidFill>
@@ -1172,14 +1172,14 @@
         <p:spPr bwMode="auto">
           <a:extLst>
             <a:ext uri="{909E8E84-426E-40DD-AFC4-6F175D3DCCD1}">
-              <a14:hiddenFill xmlns="" xmlns:a14="http://schemas.microsoft.com/office/drawing/2010/main">
+              <a14:hiddenFill xmlns:a14="http://schemas.microsoft.com/office/drawing/2010/main" xmlns="">
                 <a:solidFill>
                   <a:srgbClr val="FFFFFF"/>
                 </a:solidFill>
               </a14:hiddenFill>
             </a:ext>
             <a:ext uri="{91240B29-F687-4F45-9708-019B960494DF}">
-              <a14:hiddenLine xmlns="" xmlns:a14="http://schemas.microsoft.com/office/drawing/2010/main" w="9525">
+              <a14:hiddenLine xmlns:a14="http://schemas.microsoft.com/office/drawing/2010/main" xmlns="" w="9525">
                 <a:solidFill>
                   <a:srgbClr val="000000"/>
                 </a:solidFill>
@@ -1324,14 +1324,14 @@
         <p:spPr bwMode="auto">
           <a:extLst>
             <a:ext uri="{909E8E84-426E-40DD-AFC4-6F175D3DCCD1}">
-              <a14:hiddenFill xmlns="" xmlns:a14="http://schemas.microsoft.com/office/drawing/2010/main">
+              <a14:hiddenFill xmlns:a14="http://schemas.microsoft.com/office/drawing/2010/main" xmlns="">
                 <a:solidFill>
                   <a:srgbClr val="FFFFFF"/>
                 </a:solidFill>
               </a14:hiddenFill>
             </a:ext>
             <a:ext uri="{91240B29-F687-4F45-9708-019B960494DF}">
-              <a14:hiddenLine xmlns="" xmlns:a14="http://schemas.microsoft.com/office/drawing/2010/main" w="9525">
+              <a14:hiddenLine xmlns:a14="http://schemas.microsoft.com/office/drawing/2010/main" xmlns="" w="9525">
                 <a:solidFill>
                   <a:srgbClr val="000000"/>
                 </a:solidFill>
@@ -1476,14 +1476,14 @@
         <p:spPr bwMode="auto">
           <a:extLst>
             <a:ext uri="{909E8E84-426E-40DD-AFC4-6F175D3DCCD1}">
-              <a14:hiddenFill xmlns="" xmlns:a14="http://schemas.microsoft.com/office/drawing/2010/main">
+              <a14:hiddenFill xmlns:a14="http://schemas.microsoft.com/office/drawing/2010/main" xmlns="">
                 <a:solidFill>
                   <a:srgbClr val="FFFFFF"/>
                 </a:solidFill>
               </a14:hiddenFill>
             </a:ext>
             <a:ext uri="{91240B29-F687-4F45-9708-019B960494DF}">
-              <a14:hiddenLine xmlns="" xmlns:a14="http://schemas.microsoft.com/office/drawing/2010/main" w="9525">
+              <a14:hiddenLine xmlns:a14="http://schemas.microsoft.com/office/drawing/2010/main" xmlns="" w="9525">
                 <a:solidFill>
                   <a:srgbClr val="000000"/>
                 </a:solidFill>
@@ -1628,14 +1628,14 @@
         <p:spPr bwMode="auto">
           <a:extLst>
             <a:ext uri="{909E8E84-426E-40DD-AFC4-6F175D3DCCD1}">
-              <a14:hiddenFill xmlns="" xmlns:a14="http://schemas.microsoft.com/office/drawing/2010/main">
+              <a14:hiddenFill xmlns:a14="http://schemas.microsoft.com/office/drawing/2010/main" xmlns="">
                 <a:solidFill>
                   <a:srgbClr val="FFFFFF"/>
                 </a:solidFill>
               </a14:hiddenFill>
             </a:ext>
             <a:ext uri="{91240B29-F687-4F45-9708-019B960494DF}">
-              <a14:hiddenLine xmlns="" xmlns:a14="http://schemas.microsoft.com/office/drawing/2010/main" w="9525">
+              <a14:hiddenLine xmlns:a14="http://schemas.microsoft.com/office/drawing/2010/main" xmlns="" w="9525">
                 <a:solidFill>
                   <a:srgbClr val="000000"/>
                 </a:solidFill>
@@ -1815,14 +1815,14 @@
         <p:spPr bwMode="auto">
           <a:extLst>
             <a:ext uri="{909E8E84-426E-40DD-AFC4-6F175D3DCCD1}">
-              <a14:hiddenFill xmlns="" xmlns:a14="http://schemas.microsoft.com/office/drawing/2010/main">
+              <a14:hiddenFill xmlns:a14="http://schemas.microsoft.com/office/drawing/2010/main" xmlns="">
                 <a:solidFill>
                   <a:srgbClr val="FFFFFF"/>
                 </a:solidFill>
               </a14:hiddenFill>
             </a:ext>
             <a:ext uri="{91240B29-F687-4F45-9708-019B960494DF}">
-              <a14:hiddenLine xmlns="" xmlns:a14="http://schemas.microsoft.com/office/drawing/2010/main" w="9525">
+              <a14:hiddenLine xmlns:a14="http://schemas.microsoft.com/office/drawing/2010/main" xmlns="" w="9525">
                 <a:solidFill>
                   <a:srgbClr val="000000"/>
                 </a:solidFill>
@@ -1969,14 +1969,14 @@
         <p:spPr bwMode="auto">
           <a:extLst>
             <a:ext uri="{909E8E84-426E-40DD-AFC4-6F175D3DCCD1}">
-              <a14:hiddenFill xmlns="" xmlns:a14="http://schemas.microsoft.com/office/drawing/2010/main">
+              <a14:hiddenFill xmlns:a14="http://schemas.microsoft.com/office/drawing/2010/main" xmlns="">
                 <a:solidFill>
                   <a:srgbClr val="FFFFFF"/>
                 </a:solidFill>
               </a14:hiddenFill>
             </a:ext>
             <a:ext uri="{91240B29-F687-4F45-9708-019B960494DF}">
-              <a14:hiddenLine xmlns="" xmlns:a14="http://schemas.microsoft.com/office/drawing/2010/main" w="9525">
+              <a14:hiddenLine xmlns:a14="http://schemas.microsoft.com/office/drawing/2010/main" xmlns="" w="9525">
                 <a:solidFill>
                   <a:srgbClr val="000000"/>
                 </a:solidFill>
@@ -2123,14 +2123,14 @@
         <p:spPr bwMode="auto">
           <a:extLst>
             <a:ext uri="{909E8E84-426E-40DD-AFC4-6F175D3DCCD1}">
-              <a14:hiddenFill xmlns="" xmlns:a14="http://schemas.microsoft.com/office/drawing/2010/main">
+              <a14:hiddenFill xmlns:a14="http://schemas.microsoft.com/office/drawing/2010/main" xmlns="">
                 <a:solidFill>
                   <a:srgbClr val="FFFFFF"/>
                 </a:solidFill>
               </a14:hiddenFill>
             </a:ext>
             <a:ext uri="{91240B29-F687-4F45-9708-019B960494DF}">
-              <a14:hiddenLine xmlns="" xmlns:a14="http://schemas.microsoft.com/office/drawing/2010/main" w="9525">
+              <a14:hiddenLine xmlns:a14="http://schemas.microsoft.com/office/drawing/2010/main" xmlns="" w="9525">
                 <a:solidFill>
                   <a:srgbClr val="000000"/>
                 </a:solidFill>
@@ -2277,14 +2277,14 @@
         <p:spPr bwMode="auto">
           <a:extLst>
             <a:ext uri="{909E8E84-426E-40DD-AFC4-6F175D3DCCD1}">
-              <a14:hiddenFill xmlns="" xmlns:a14="http://schemas.microsoft.com/office/drawing/2010/main">
+              <a14:hiddenFill xmlns:a14="http://schemas.microsoft.com/office/drawing/2010/main" xmlns="">
                 <a:solidFill>
                   <a:srgbClr val="FFFFFF"/>
                 </a:solidFill>
               </a14:hiddenFill>
             </a:ext>
             <a:ext uri="{91240B29-F687-4F45-9708-019B960494DF}">
-              <a14:hiddenLine xmlns="" xmlns:a14="http://schemas.microsoft.com/office/drawing/2010/main" w="9525">
+              <a14:hiddenLine xmlns:a14="http://schemas.microsoft.com/office/drawing/2010/main" xmlns="" w="9525">
                 <a:solidFill>
                   <a:srgbClr val="000000"/>
                 </a:solidFill>
@@ -2452,7 +2452,7 @@
           </a:ln>
           <a:extLst>
             <a:ext uri="{909E8E84-426E-40DD-AFC4-6F175D3DCCD1}">
-              <a14:hiddenFill xmlns="" xmlns:a14="http://schemas.microsoft.com/office/drawing/2010/main">
+              <a14:hiddenFill xmlns:a14="http://schemas.microsoft.com/office/drawing/2010/main" xmlns="">
                 <a:solidFill>
                   <a:srgbClr val="FFFFFF"/>
                 </a:solidFill>
@@ -2479,14 +2479,14 @@
           <a:noFill/>
           <a:extLst>
             <a:ext uri="{909E8E84-426E-40DD-AFC4-6F175D3DCCD1}">
-              <a14:hiddenFill xmlns="" xmlns:a14="http://schemas.microsoft.com/office/drawing/2010/main">
+              <a14:hiddenFill xmlns:a14="http://schemas.microsoft.com/office/drawing/2010/main" xmlns="">
                 <a:solidFill>
                   <a:srgbClr val="FFFFFF"/>
                 </a:solidFill>
               </a14:hiddenFill>
             </a:ext>
             <a:ext uri="{91240B29-F687-4F45-9708-019B960494DF}">
-              <a14:hiddenLine xmlns="" xmlns:a14="http://schemas.microsoft.com/office/drawing/2010/main" w="9525">
+              <a14:hiddenLine xmlns:a14="http://schemas.microsoft.com/office/drawing/2010/main" xmlns="" w="9525">
                 <a:solidFill>
                   <a:srgbClr val="000000"/>
                 </a:solidFill>
@@ -2552,14 +2552,14 @@
         <p:spPr bwMode="auto">
           <a:extLst>
             <a:ext uri="{909E8E84-426E-40DD-AFC4-6F175D3DCCD1}">
-              <a14:hiddenFill xmlns="" xmlns:a14="http://schemas.microsoft.com/office/drawing/2010/main">
+              <a14:hiddenFill xmlns:a14="http://schemas.microsoft.com/office/drawing/2010/main" xmlns="">
                 <a:solidFill>
                   <a:srgbClr val="FFFFFF"/>
                 </a:solidFill>
               </a14:hiddenFill>
             </a:ext>
             <a:ext uri="{91240B29-F687-4F45-9708-019B960494DF}">
-              <a14:hiddenLine xmlns="" xmlns:a14="http://schemas.microsoft.com/office/drawing/2010/main" w="9525">
+              <a14:hiddenLine xmlns:a14="http://schemas.microsoft.com/office/drawing/2010/main" xmlns="" w="9525">
                 <a:solidFill>
                   <a:srgbClr val="000000"/>
                 </a:solidFill>
@@ -2706,14 +2706,14 @@
         <p:spPr bwMode="auto">
           <a:extLst>
             <a:ext uri="{909E8E84-426E-40DD-AFC4-6F175D3DCCD1}">
-              <a14:hiddenFill xmlns="" xmlns:a14="http://schemas.microsoft.com/office/drawing/2010/main">
+              <a14:hiddenFill xmlns:a14="http://schemas.microsoft.com/office/drawing/2010/main" xmlns="">
                 <a:solidFill>
                   <a:srgbClr val="FFFFFF"/>
                 </a:solidFill>
               </a14:hiddenFill>
             </a:ext>
             <a:ext uri="{91240B29-F687-4F45-9708-019B960494DF}">
-              <a14:hiddenLine xmlns="" xmlns:a14="http://schemas.microsoft.com/office/drawing/2010/main" w="9525">
+              <a14:hiddenLine xmlns:a14="http://schemas.microsoft.com/office/drawing/2010/main" xmlns="" w="9525">
                 <a:solidFill>
                   <a:srgbClr val="000000"/>
                 </a:solidFill>
@@ -2860,14 +2860,14 @@
         <p:spPr bwMode="auto">
           <a:extLst>
             <a:ext uri="{909E8E84-426E-40DD-AFC4-6F175D3DCCD1}">
-              <a14:hiddenFill xmlns="" xmlns:a14="http://schemas.microsoft.com/office/drawing/2010/main">
+              <a14:hiddenFill xmlns:a14="http://schemas.microsoft.com/office/drawing/2010/main" xmlns="">
                 <a:solidFill>
                   <a:srgbClr val="FFFFFF"/>
                 </a:solidFill>
               </a14:hiddenFill>
             </a:ext>
             <a:ext uri="{91240B29-F687-4F45-9708-019B960494DF}">
-              <a14:hiddenLine xmlns="" xmlns:a14="http://schemas.microsoft.com/office/drawing/2010/main" w="9525">
+              <a14:hiddenLine xmlns:a14="http://schemas.microsoft.com/office/drawing/2010/main" xmlns="" w="9525">
                 <a:solidFill>
                   <a:srgbClr val="000000"/>
                 </a:solidFill>
@@ -3014,14 +3014,14 @@
         <p:spPr bwMode="auto">
           <a:extLst>
             <a:ext uri="{909E8E84-426E-40DD-AFC4-6F175D3DCCD1}">
-              <a14:hiddenFill xmlns="" xmlns:a14="http://schemas.microsoft.com/office/drawing/2010/main">
+              <a14:hiddenFill xmlns:a14="http://schemas.microsoft.com/office/drawing/2010/main" xmlns="">
                 <a:solidFill>
                   <a:srgbClr val="FFFFFF"/>
                 </a:solidFill>
               </a14:hiddenFill>
             </a:ext>
             <a:ext uri="{91240B29-F687-4F45-9708-019B960494DF}">
-              <a14:hiddenLine xmlns="" xmlns:a14="http://schemas.microsoft.com/office/drawing/2010/main" w="9525">
+              <a14:hiddenLine xmlns:a14="http://schemas.microsoft.com/office/drawing/2010/main" xmlns="" w="9525">
                 <a:solidFill>
                   <a:srgbClr val="000000"/>
                 </a:solidFill>
@@ -3189,7 +3189,7 @@
           </a:ln>
           <a:extLst>
             <a:ext uri="{909E8E84-426E-40DD-AFC4-6F175D3DCCD1}">
-              <a14:hiddenFill xmlns="" xmlns:a14="http://schemas.microsoft.com/office/drawing/2010/main">
+              <a14:hiddenFill xmlns:a14="http://schemas.microsoft.com/office/drawing/2010/main" xmlns="">
                 <a:solidFill>
                   <a:srgbClr val="FFFFFF"/>
                 </a:solidFill>
@@ -3212,14 +3212,14 @@
           <a:noFill/>
           <a:extLst>
             <a:ext uri="{909E8E84-426E-40DD-AFC4-6F175D3DCCD1}">
-              <a14:hiddenFill xmlns="" xmlns:a14="http://schemas.microsoft.com/office/drawing/2010/main">
+              <a14:hiddenFill xmlns:a14="http://schemas.microsoft.com/office/drawing/2010/main" xmlns="">
                 <a:solidFill>
                   <a:srgbClr val="FFFFFF"/>
                 </a:solidFill>
               </a14:hiddenFill>
             </a:ext>
             <a:ext uri="{91240B29-F687-4F45-9708-019B960494DF}">
-              <a14:hiddenLine xmlns="" xmlns:a14="http://schemas.microsoft.com/office/drawing/2010/main" w="9525">
+              <a14:hiddenLine xmlns:a14="http://schemas.microsoft.com/office/drawing/2010/main" xmlns="" w="9525">
                 <a:solidFill>
                   <a:srgbClr val="000000"/>
                 </a:solidFill>
@@ -3285,14 +3285,14 @@
         <p:spPr bwMode="auto">
           <a:extLst>
             <a:ext uri="{909E8E84-426E-40DD-AFC4-6F175D3DCCD1}">
-              <a14:hiddenFill xmlns="" xmlns:a14="http://schemas.microsoft.com/office/drawing/2010/main">
+              <a14:hiddenFill xmlns:a14="http://schemas.microsoft.com/office/drawing/2010/main" xmlns="">
                 <a:solidFill>
                   <a:srgbClr val="FFFFFF"/>
                 </a:solidFill>
               </a14:hiddenFill>
             </a:ext>
             <a:ext uri="{91240B29-F687-4F45-9708-019B960494DF}">
-              <a14:hiddenLine xmlns="" xmlns:a14="http://schemas.microsoft.com/office/drawing/2010/main" w="9525">
+              <a14:hiddenLine xmlns:a14="http://schemas.microsoft.com/office/drawing/2010/main" xmlns="" w="9525">
                 <a:solidFill>
                   <a:srgbClr val="000000"/>
                 </a:solidFill>
@@ -3439,14 +3439,14 @@
         <p:spPr bwMode="auto">
           <a:extLst>
             <a:ext uri="{909E8E84-426E-40DD-AFC4-6F175D3DCCD1}">
-              <a14:hiddenFill xmlns="" xmlns:a14="http://schemas.microsoft.com/office/drawing/2010/main">
+              <a14:hiddenFill xmlns:a14="http://schemas.microsoft.com/office/drawing/2010/main" xmlns="">
                 <a:solidFill>
                   <a:srgbClr val="FFFFFF"/>
                 </a:solidFill>
               </a14:hiddenFill>
             </a:ext>
             <a:ext uri="{91240B29-F687-4F45-9708-019B960494DF}">
-              <a14:hiddenLine xmlns="" xmlns:a14="http://schemas.microsoft.com/office/drawing/2010/main" w="9525">
+              <a14:hiddenLine xmlns:a14="http://schemas.microsoft.com/office/drawing/2010/main" xmlns="" w="9525">
                 <a:solidFill>
                   <a:srgbClr val="000000"/>
                 </a:solidFill>
@@ -3593,14 +3593,14 @@
         <p:spPr bwMode="auto">
           <a:extLst>
             <a:ext uri="{909E8E84-426E-40DD-AFC4-6F175D3DCCD1}">
-              <a14:hiddenFill xmlns="" xmlns:a14="http://schemas.microsoft.com/office/drawing/2010/main">
+              <a14:hiddenFill xmlns:a14="http://schemas.microsoft.com/office/drawing/2010/main" xmlns="">
                 <a:solidFill>
                   <a:srgbClr val="FFFFFF"/>
                 </a:solidFill>
               </a14:hiddenFill>
             </a:ext>
             <a:ext uri="{91240B29-F687-4F45-9708-019B960494DF}">
-              <a14:hiddenLine xmlns="" xmlns:a14="http://schemas.microsoft.com/office/drawing/2010/main" w="9525">
+              <a14:hiddenLine xmlns:a14="http://schemas.microsoft.com/office/drawing/2010/main" xmlns="" w="9525">
                 <a:solidFill>
                   <a:srgbClr val="000000"/>
                 </a:solidFill>
@@ -3747,14 +3747,14 @@
         <p:spPr bwMode="auto">
           <a:extLst>
             <a:ext uri="{909E8E84-426E-40DD-AFC4-6F175D3DCCD1}">
-              <a14:hiddenFill xmlns="" xmlns:a14="http://schemas.microsoft.com/office/drawing/2010/main">
+              <a14:hiddenFill xmlns:a14="http://schemas.microsoft.com/office/drawing/2010/main" xmlns="">
                 <a:solidFill>
                   <a:srgbClr val="FFFFFF"/>
                 </a:solidFill>
               </a14:hiddenFill>
             </a:ext>
             <a:ext uri="{91240B29-F687-4F45-9708-019B960494DF}">
-              <a14:hiddenLine xmlns="" xmlns:a14="http://schemas.microsoft.com/office/drawing/2010/main" w="9525">
+              <a14:hiddenLine xmlns:a14="http://schemas.microsoft.com/office/drawing/2010/main" xmlns="" w="9525">
                 <a:solidFill>
                   <a:srgbClr val="000000"/>
                 </a:solidFill>
@@ -3922,7 +3922,7 @@
           </a:ln>
           <a:extLst>
             <a:ext uri="{909E8E84-426E-40DD-AFC4-6F175D3DCCD1}">
-              <a14:hiddenFill xmlns="" xmlns:a14="http://schemas.microsoft.com/office/drawing/2010/main">
+              <a14:hiddenFill xmlns:a14="http://schemas.microsoft.com/office/drawing/2010/main" xmlns="">
                 <a:solidFill>
                   <a:srgbClr val="FFFFFF"/>
                 </a:solidFill>
@@ -3945,14 +3945,14 @@
           <a:noFill/>
           <a:extLst>
             <a:ext uri="{909E8E84-426E-40DD-AFC4-6F175D3DCCD1}">
-              <a14:hiddenFill xmlns="" xmlns:a14="http://schemas.microsoft.com/office/drawing/2010/main">
+              <a14:hiddenFill xmlns:a14="http://schemas.microsoft.com/office/drawing/2010/main" xmlns="">
                 <a:solidFill>
                   <a:srgbClr val="FFFFFF"/>
                 </a:solidFill>
               </a14:hiddenFill>
             </a:ext>
             <a:ext uri="{91240B29-F687-4F45-9708-019B960494DF}">
-              <a14:hiddenLine xmlns="" xmlns:a14="http://schemas.microsoft.com/office/drawing/2010/main" w="9525">
+              <a14:hiddenLine xmlns:a14="http://schemas.microsoft.com/office/drawing/2010/main" xmlns="" w="9525">
                 <a:solidFill>
                   <a:srgbClr val="000000"/>
                 </a:solidFill>
@@ -4017,7 +4017,7 @@
           <a:blip r:embed="rId2" cstate="print">
             <a:extLst>
               <a:ext uri="{28A0092B-C50C-407E-A947-70E740481C1C}">
-                <a14:useLocalDpi xmlns="" xmlns:a14="http://schemas.microsoft.com/office/drawing/2010/main" val="0"/>
+                <a14:useLocalDpi xmlns:a14="http://schemas.microsoft.com/office/drawing/2010/main" xmlns="" val="0"/>
               </a:ext>
             </a:extLst>
           </a:blip>
@@ -4041,14 +4041,14 @@
           <a:effectLst/>
           <a:extLst>
             <a:ext uri="{909E8E84-426E-40DD-AFC4-6F175D3DCCD1}">
-              <a14:hiddenFill xmlns="" xmlns:a14="http://schemas.microsoft.com/office/drawing/2010/main">
+              <a14:hiddenFill xmlns:a14="http://schemas.microsoft.com/office/drawing/2010/main" xmlns="">
                 <a:solidFill>
                   <a:schemeClr val="accent1"/>
                 </a:solidFill>
               </a14:hiddenFill>
             </a:ext>
             <a:ext uri="{91240B29-F687-4F45-9708-019B960494DF}">
-              <a14:hiddenLine xmlns="" xmlns:a14="http://schemas.microsoft.com/office/drawing/2010/main" w="12700" algn="ctr">
+              <a14:hiddenLine xmlns:a14="http://schemas.microsoft.com/office/drawing/2010/main" xmlns="" w="12700" algn="ctr">
                 <a:solidFill>
                   <a:schemeClr val="tx1"/>
                 </a:solidFill>
@@ -4058,7 +4058,7 @@
               </a14:hiddenLine>
             </a:ext>
             <a:ext uri="{AF507438-7753-43E0-B8FC-AC1667EBCBE1}">
-              <a14:hiddenEffects xmlns="" xmlns:a14="http://schemas.microsoft.com/office/drawing/2010/main">
+              <a14:hiddenEffects xmlns:a14="http://schemas.microsoft.com/office/drawing/2010/main" xmlns="">
                 <a:effectLst>
                   <a:outerShdw dist="35921" dir="2700000" algn="ctr" rotWithShape="0">
                     <a:schemeClr val="bg2"/>
@@ -4099,7 +4099,7 @@
             <a:blip r:embed="rId4" cstate="print">
               <a:extLst>
                 <a:ext uri="{28A0092B-C50C-407E-A947-70E740481C1C}">
-                  <a14:useLocalDpi xmlns="" xmlns:a14="http://schemas.microsoft.com/office/drawing/2010/main" val="0"/>
+                  <a14:useLocalDpi xmlns:a14="http://schemas.microsoft.com/office/drawing/2010/main" xmlns="" val="0"/>
                 </a:ext>
               </a:extLst>
             </a:blip>
@@ -4122,14 +4122,14 @@
             </a:ln>
             <a:extLst>
               <a:ext uri="{909E8E84-426E-40DD-AFC4-6F175D3DCCD1}">
-                <a14:hiddenFill xmlns="" xmlns:a14="http://schemas.microsoft.com/office/drawing/2010/main">
+                <a14:hiddenFill xmlns:a14="http://schemas.microsoft.com/office/drawing/2010/main" xmlns="">
                   <a:solidFill>
                     <a:srgbClr val="FFFFFF"/>
                   </a:solidFill>
                 </a14:hiddenFill>
               </a:ext>
               <a:ext uri="{91240B29-F687-4F45-9708-019B960494DF}">
-                <a14:hiddenLine xmlns="" xmlns:a14="http://schemas.microsoft.com/office/drawing/2010/main" w="9525">
+                <a14:hiddenLine xmlns:a14="http://schemas.microsoft.com/office/drawing/2010/main" xmlns="" w="9525">
                   <a:solidFill>
                     <a:srgbClr val="000000"/>
                   </a:solidFill>
@@ -4163,14 +4163,14 @@
             </a:ln>
             <a:extLst>
               <a:ext uri="{909E8E84-426E-40DD-AFC4-6F175D3DCCD1}">
-                <a14:hiddenFill xmlns="" xmlns:a14="http://schemas.microsoft.com/office/drawing/2010/main">
+                <a14:hiddenFill xmlns:a14="http://schemas.microsoft.com/office/drawing/2010/main" xmlns="">
                   <a:solidFill>
                     <a:srgbClr val="FFFFFF"/>
                   </a:solidFill>
                 </a14:hiddenFill>
               </a:ext>
               <a:ext uri="{91240B29-F687-4F45-9708-019B960494DF}">
-                <a14:hiddenLine xmlns="" xmlns:a14="http://schemas.microsoft.com/office/drawing/2010/main" w="9525">
+                <a14:hiddenLine xmlns:a14="http://schemas.microsoft.com/office/drawing/2010/main" xmlns="" w="9525">
                   <a:solidFill>
                     <a:srgbClr val="000000"/>
                   </a:solidFill>
@@ -4342,14 +4342,14 @@
           </a:ln>
           <a:extLst>
             <a:ext uri="{909E8E84-426E-40DD-AFC4-6F175D3DCCD1}">
-              <a14:hiddenFill xmlns="" xmlns:a14="http://schemas.microsoft.com/office/drawing/2010/main">
+              <a14:hiddenFill xmlns:a14="http://schemas.microsoft.com/office/drawing/2010/main" xmlns="">
                 <a:solidFill>
                   <a:srgbClr val="FFFFFF"/>
                 </a:solidFill>
               </a14:hiddenFill>
             </a:ext>
             <a:ext uri="{91240B29-F687-4F45-9708-019B960494DF}">
-              <a14:hiddenLine xmlns="" xmlns:a14="http://schemas.microsoft.com/office/drawing/2010/main" w="9525">
+              <a14:hiddenLine xmlns:a14="http://schemas.microsoft.com/office/drawing/2010/main" xmlns="" w="9525">
                 <a:solidFill>
                   <a:srgbClr val="000000"/>
                 </a:solidFill>
@@ -4726,7 +4726,7 @@
     </p:spTree>
     <p:extLst>
       <p:ext uri="{BB962C8B-B14F-4D97-AF65-F5344CB8AC3E}">
-        <p14:creationId xmlns="" xmlns:p14="http://schemas.microsoft.com/office/powerpoint/2010/main" val="2588080409"/>
+        <p14:creationId xmlns:p14="http://schemas.microsoft.com/office/powerpoint/2010/main" xmlns="" val="2588080409"/>
       </p:ext>
     </p:extLst>
   </p:cSld>
@@ -4957,7 +4957,7 @@
     </p:spTree>
     <p:extLst>
       <p:ext uri="{BB962C8B-B14F-4D97-AF65-F5344CB8AC3E}">
-        <p14:creationId xmlns="" xmlns:p14="http://schemas.microsoft.com/office/powerpoint/2010/main" val="2741523762"/>
+        <p14:creationId xmlns:p14="http://schemas.microsoft.com/office/powerpoint/2010/main" xmlns="" val="2741523762"/>
       </p:ext>
     </p:extLst>
   </p:cSld>
@@ -5189,7 +5189,7 @@
     </p:spTree>
     <p:extLst>
       <p:ext uri="{BB962C8B-B14F-4D97-AF65-F5344CB8AC3E}">
-        <p14:creationId xmlns="" xmlns:p14="http://schemas.microsoft.com/office/powerpoint/2010/main" val="2682078689"/>
+        <p14:creationId xmlns:p14="http://schemas.microsoft.com/office/powerpoint/2010/main" xmlns="" val="2682078689"/>
       </p:ext>
     </p:extLst>
   </p:cSld>
@@ -5534,7 +5534,7 @@
     </p:spTree>
     <p:extLst>
       <p:ext uri="{BB962C8B-B14F-4D97-AF65-F5344CB8AC3E}">
-        <p14:creationId xmlns="" xmlns:p14="http://schemas.microsoft.com/office/powerpoint/2010/main" val="1967580509"/>
+        <p14:creationId xmlns:p14="http://schemas.microsoft.com/office/powerpoint/2010/main" xmlns="" val="1967580509"/>
       </p:ext>
     </p:extLst>
   </p:cSld>
@@ -5999,7 +5999,7 @@
     </p:spTree>
     <p:extLst>
       <p:ext uri="{BB962C8B-B14F-4D97-AF65-F5344CB8AC3E}">
-        <p14:creationId xmlns="" xmlns:p14="http://schemas.microsoft.com/office/powerpoint/2010/main" val="4110782242"/>
+        <p14:creationId xmlns:p14="http://schemas.microsoft.com/office/powerpoint/2010/main" xmlns="" val="4110782242"/>
       </p:ext>
     </p:extLst>
   </p:cSld>
@@ -6157,7 +6157,7 @@
     </p:spTree>
     <p:extLst>
       <p:ext uri="{BB962C8B-B14F-4D97-AF65-F5344CB8AC3E}">
-        <p14:creationId xmlns="" xmlns:p14="http://schemas.microsoft.com/office/powerpoint/2010/main" val="1892974325"/>
+        <p14:creationId xmlns:p14="http://schemas.microsoft.com/office/powerpoint/2010/main" xmlns="" val="1892974325"/>
       </p:ext>
     </p:extLst>
   </p:cSld>
@@ -6287,7 +6287,7 @@
     </p:spTree>
     <p:extLst>
       <p:ext uri="{BB962C8B-B14F-4D97-AF65-F5344CB8AC3E}">
-        <p14:creationId xmlns="" xmlns:p14="http://schemas.microsoft.com/office/powerpoint/2010/main" val="606310080"/>
+        <p14:creationId xmlns:p14="http://schemas.microsoft.com/office/powerpoint/2010/main" xmlns="" val="606310080"/>
       </p:ext>
     </p:extLst>
   </p:cSld>
@@ -6328,7 +6328,7 @@
           <a:blip r:embed="rId3" cstate="print">
             <a:extLst>
               <a:ext uri="{28A0092B-C50C-407E-A947-70E740481C1C}">
-                <a14:useLocalDpi xmlns="" xmlns:a14="http://schemas.microsoft.com/office/drawing/2010/main" val="0"/>
+                <a14:useLocalDpi xmlns:a14="http://schemas.microsoft.com/office/drawing/2010/main" xmlns="" val="0"/>
               </a:ext>
             </a:extLst>
           </a:blip>
@@ -6351,14 +6351,14 @@
           </a:ln>
           <a:extLst>
             <a:ext uri="{909E8E84-426E-40DD-AFC4-6F175D3DCCD1}">
-              <a14:hiddenFill xmlns="" xmlns:a14="http://schemas.microsoft.com/office/drawing/2010/main">
+              <a14:hiddenFill xmlns:a14="http://schemas.microsoft.com/office/drawing/2010/main" xmlns="">
                 <a:solidFill>
                   <a:srgbClr val="FFFFFF"/>
                 </a:solidFill>
               </a14:hiddenFill>
             </a:ext>
             <a:ext uri="{91240B29-F687-4F45-9708-019B960494DF}">
-              <a14:hiddenLine xmlns="" xmlns:a14="http://schemas.microsoft.com/office/drawing/2010/main" w="9525">
+              <a14:hiddenLine xmlns:a14="http://schemas.microsoft.com/office/drawing/2010/main" xmlns="" w="9525">
                 <a:solidFill>
                   <a:srgbClr val="000000"/>
                 </a:solidFill>
@@ -6519,7 +6519,7 @@
     </p:spTree>
     <p:extLst>
       <p:ext uri="{BB962C8B-B14F-4D97-AF65-F5344CB8AC3E}">
-        <p14:creationId xmlns="" xmlns:p14="http://schemas.microsoft.com/office/powerpoint/2010/main" val="1504093363"/>
+        <p14:creationId xmlns:p14="http://schemas.microsoft.com/office/powerpoint/2010/main" xmlns="" val="1504093363"/>
       </p:ext>
     </p:extLst>
   </p:cSld>
@@ -6580,14 +6580,14 @@
           </a:ln>
           <a:extLst>
             <a:ext uri="{909E8E84-426E-40DD-AFC4-6F175D3DCCD1}">
-              <a14:hiddenFill xmlns="" xmlns:a14="http://schemas.microsoft.com/office/drawing/2010/main">
+              <a14:hiddenFill xmlns:a14="http://schemas.microsoft.com/office/drawing/2010/main" xmlns="">
                 <a:solidFill>
                   <a:srgbClr val="FFFFFF"/>
                 </a:solidFill>
               </a14:hiddenFill>
             </a:ext>
             <a:ext uri="{91240B29-F687-4F45-9708-019B960494DF}">
-              <a14:hiddenLine xmlns="" xmlns:a14="http://schemas.microsoft.com/office/drawing/2010/main" w="9525">
+              <a14:hiddenLine xmlns:a14="http://schemas.microsoft.com/office/drawing/2010/main" xmlns="" w="9525">
                 <a:solidFill>
                   <a:srgbClr val="000000"/>
                 </a:solidFill>
@@ -6638,14 +6638,14 @@
           </a:ln>
           <a:extLst>
             <a:ext uri="{909E8E84-426E-40DD-AFC4-6F175D3DCCD1}">
-              <a14:hiddenFill xmlns="" xmlns:a14="http://schemas.microsoft.com/office/drawing/2010/main">
+              <a14:hiddenFill xmlns:a14="http://schemas.microsoft.com/office/drawing/2010/main" xmlns="">
                 <a:solidFill>
                   <a:srgbClr val="FFFFFF"/>
                 </a:solidFill>
               </a14:hiddenFill>
             </a:ext>
             <a:ext uri="{91240B29-F687-4F45-9708-019B960494DF}">
-              <a14:hiddenLine xmlns="" xmlns:a14="http://schemas.microsoft.com/office/drawing/2010/main" w="9525">
+              <a14:hiddenLine xmlns:a14="http://schemas.microsoft.com/office/drawing/2010/main" xmlns="" w="9525">
                 <a:solidFill>
                   <a:srgbClr val="000000"/>
                 </a:solidFill>
@@ -6990,7 +6990,7 @@
           <a:blip r:embed="rId11" cstate="print">
             <a:extLst>
               <a:ext uri="{28A0092B-C50C-407E-A947-70E740481C1C}">
-                <a14:useLocalDpi xmlns="" xmlns:a14="http://schemas.microsoft.com/office/drawing/2010/main" val="0"/>
+                <a14:useLocalDpi xmlns:a14="http://schemas.microsoft.com/office/drawing/2010/main" xmlns="" val="0"/>
               </a:ext>
             </a:extLst>
           </a:blip>
@@ -7013,14 +7013,14 @@
           </a:ln>
           <a:extLst>
             <a:ext uri="{909E8E84-426E-40DD-AFC4-6F175D3DCCD1}">
-              <a14:hiddenFill xmlns="" xmlns:a14="http://schemas.microsoft.com/office/drawing/2010/main">
+              <a14:hiddenFill xmlns:a14="http://schemas.microsoft.com/office/drawing/2010/main" xmlns="">
                 <a:solidFill>
                   <a:srgbClr val="FFFFFF"/>
                 </a:solidFill>
               </a14:hiddenFill>
             </a:ext>
             <a:ext uri="{91240B29-F687-4F45-9708-019B960494DF}">
-              <a14:hiddenLine xmlns="" xmlns:a14="http://schemas.microsoft.com/office/drawing/2010/main" w="9525">
+              <a14:hiddenLine xmlns:a14="http://schemas.microsoft.com/office/drawing/2010/main" xmlns="" w="9525">
                 <a:solidFill>
                   <a:srgbClr val="000000"/>
                 </a:solidFill>
@@ -7761,11 +7761,7 @@
             </a:pPr>
             <a:r>
               <a:rPr lang="en-US" dirty="0" smtClean="0"/>
-              <a:t>Throughout </a:t>
-            </a:r>
-            <a:r>
-              <a:rPr lang="en-US" dirty="0" smtClean="0"/>
-              <a:t>the PowerPoint template, replace placeholders &lt;…&gt; with the appropriate information.</a:t>
+              <a:t>Throughout the PowerPoint template, replace placeholders &lt;…&gt; with the appropriate information.</a:t>
             </a:r>
           </a:p>
           <a:p>
@@ -7979,13 +7975,8 @@
             <a:pPr eaLnBrk="1" hangingPunct="1"/>
             <a:r>
               <a:rPr lang="en-US" dirty="0" smtClean="0"/>
-              <a:t>Bug Fix </a:t>
-            </a:r>
-            <a:r>
-              <a:rPr lang="en-US" dirty="0" smtClean="0"/>
-              <a:t>everything</a:t>
-            </a:r>
-            <a:endParaRPr lang="en-US" dirty="0" smtClean="0"/>
+              <a:t>Bug Fix everything</a:t>
+            </a:r>
           </a:p>
           <a:p>
             <a:pPr eaLnBrk="1" hangingPunct="1"/>
@@ -8020,12 +8011,24 @@
             <a:pPr eaLnBrk="1" hangingPunct="1"/>
             <a:r>
               <a:rPr lang="en-US" dirty="0" smtClean="0"/>
-              <a:t>Project </a:t>
+              <a:t>Project Plan </a:t>
+            </a:r>
+            <a:r>
+              <a:rPr lang="en-US" dirty="0" smtClean="0"/>
+              <a:t>Document</a:t>
+            </a:r>
+          </a:p>
+          <a:p>
+            <a:pPr eaLnBrk="1" hangingPunct="1"/>
+            <a:r>
+              <a:rPr lang="en-US" dirty="0" smtClean="0"/>
+              <a:t>Popup close causes </a:t>
             </a:r>
             <a:r>
               <a:rPr lang="en-US" smtClean="0"/>
-              <a:t>Plan Document</a:t>
-            </a:r>
+              <a:t>Swipe Gesture</a:t>
+            </a:r>
+            <a:endParaRPr lang="en-US" dirty="0" smtClean="0"/>
           </a:p>
           <a:p>
             <a:pPr eaLnBrk="1" hangingPunct="1"/>

</xml_diff>

<commit_message>
trying to do elevator things
</commit_message>
<xml_diff>
--- a/documents/presentations/beta-presentation/team-urban-science-beta-presentation.pptx
+++ b/documents/presentations/beta-presentation/team-urban-science-beta-presentation.pptx
@@ -8022,11 +8022,22 @@
             <a:pPr eaLnBrk="1" hangingPunct="1"/>
             <a:r>
               <a:rPr lang="en-US" dirty="0" smtClean="0"/>
-              <a:t>Popup close causes </a:t>
+              <a:t>Popup close causes Swipe Gesture</a:t>
+            </a:r>
+          </a:p>
+          <a:p>
+            <a:pPr eaLnBrk="1" hangingPunct="1"/>
+            <a:r>
+              <a:rPr lang="en-US" dirty="0" smtClean="0"/>
+              <a:t>Lead </a:t>
+            </a:r>
+            <a:r>
+              <a:rPr lang="en-US" dirty="0" err="1" smtClean="0"/>
+              <a:t>infographic</a:t>
             </a:r>
             <a:r>
               <a:rPr lang="en-US" smtClean="0"/>
-              <a:t>Swipe Gesture</a:t>
+              <a:t> orientation issue</a:t>
             </a:r>
             <a:endParaRPr lang="en-US" dirty="0" smtClean="0"/>
           </a:p>

</xml_diff>

<commit_message>
changes to beta pres, screen shots i think
</commit_message>
<xml_diff>
--- a/documents/presentations/beta-presentation/team-urban-science-beta-presentation.pptx
+++ b/documents/presentations/beta-presentation/team-urban-science-beta-presentation.pptx
@@ -402,7 +402,7 @@
           <a:blip r:embed="rId2" cstate="print">
             <a:extLst>
               <a:ext uri="{28A0092B-C50C-407E-A947-70E740481C1C}">
-                <a14:useLocalDpi xmlns="" xmlns:a14="http://schemas.microsoft.com/office/drawing/2010/main" val="0"/>
+                <a14:useLocalDpi xmlns:a14="http://schemas.microsoft.com/office/drawing/2010/main" xmlns="" val="0"/>
               </a:ext>
             </a:extLst>
           </a:blip>
@@ -425,14 +425,14 @@
           </a:ln>
           <a:extLst>
             <a:ext uri="{909E8E84-426E-40DD-AFC4-6F175D3DCCD1}">
-              <a14:hiddenFill xmlns="" xmlns:a14="http://schemas.microsoft.com/office/drawing/2010/main">
+              <a14:hiddenFill xmlns:a14="http://schemas.microsoft.com/office/drawing/2010/main" xmlns="">
                 <a:solidFill>
                   <a:srgbClr val="FFFFFF"/>
                 </a:solidFill>
               </a14:hiddenFill>
             </a:ext>
             <a:ext uri="{91240B29-F687-4F45-9708-019B960494DF}">
-              <a14:hiddenLine xmlns="" xmlns:a14="http://schemas.microsoft.com/office/drawing/2010/main" w="9525">
+              <a14:hiddenLine xmlns:a14="http://schemas.microsoft.com/office/drawing/2010/main" xmlns="" w="9525">
                 <a:solidFill>
                   <a:srgbClr val="000000"/>
                 </a:solidFill>
@@ -466,14 +466,14 @@
           </a:ln>
           <a:extLst>
             <a:ext uri="{909E8E84-426E-40DD-AFC4-6F175D3DCCD1}">
-              <a14:hiddenFill xmlns="" xmlns:a14="http://schemas.microsoft.com/office/drawing/2010/main">
+              <a14:hiddenFill xmlns:a14="http://schemas.microsoft.com/office/drawing/2010/main" xmlns="">
                 <a:solidFill>
                   <a:srgbClr val="FFFFFF"/>
                 </a:solidFill>
               </a14:hiddenFill>
             </a:ext>
             <a:ext uri="{91240B29-F687-4F45-9708-019B960494DF}">
-              <a14:hiddenLine xmlns="" xmlns:a14="http://schemas.microsoft.com/office/drawing/2010/main" w="9525">
+              <a14:hiddenLine xmlns:a14="http://schemas.microsoft.com/office/drawing/2010/main" xmlns="" w="9525">
                 <a:solidFill>
                   <a:srgbClr val="000000"/>
                 </a:solidFill>
@@ -607,7 +607,7 @@
     </p:spTree>
     <p:extLst>
       <p:ext uri="{BB962C8B-B14F-4D97-AF65-F5344CB8AC3E}">
-        <p14:creationId xmlns="" xmlns:p14="http://schemas.microsoft.com/office/powerpoint/2010/main" val="232417806"/>
+        <p14:creationId xmlns:p14="http://schemas.microsoft.com/office/powerpoint/2010/main" xmlns="" val="232417806"/>
       </p:ext>
     </p:extLst>
   </p:cSld>
@@ -933,7 +933,7 @@
     </p:spTree>
     <p:extLst>
       <p:ext uri="{BB962C8B-B14F-4D97-AF65-F5344CB8AC3E}">
-        <p14:creationId xmlns="" xmlns:p14="http://schemas.microsoft.com/office/powerpoint/2010/main" val="2158654164"/>
+        <p14:creationId xmlns:p14="http://schemas.microsoft.com/office/powerpoint/2010/main" xmlns="" val="2158654164"/>
       </p:ext>
     </p:extLst>
   </p:cSld>
@@ -1094,14 +1094,14 @@
         <p:spPr bwMode="auto">
           <a:extLst>
             <a:ext uri="{909E8E84-426E-40DD-AFC4-6F175D3DCCD1}">
-              <a14:hiddenFill xmlns="" xmlns:a14="http://schemas.microsoft.com/office/drawing/2010/main">
+              <a14:hiddenFill xmlns:a14="http://schemas.microsoft.com/office/drawing/2010/main" xmlns="">
                 <a:solidFill>
                   <a:srgbClr val="FFFFFF"/>
                 </a:solidFill>
               </a14:hiddenFill>
             </a:ext>
             <a:ext uri="{91240B29-F687-4F45-9708-019B960494DF}">
-              <a14:hiddenLine xmlns="" xmlns:a14="http://schemas.microsoft.com/office/drawing/2010/main" w="9525">
+              <a14:hiddenLine xmlns:a14="http://schemas.microsoft.com/office/drawing/2010/main" xmlns="" w="9525">
                 <a:solidFill>
                   <a:srgbClr val="000000"/>
                 </a:solidFill>
@@ -1248,14 +1248,14 @@
         <p:spPr bwMode="auto">
           <a:extLst>
             <a:ext uri="{909E8E84-426E-40DD-AFC4-6F175D3DCCD1}">
-              <a14:hiddenFill xmlns="" xmlns:a14="http://schemas.microsoft.com/office/drawing/2010/main">
+              <a14:hiddenFill xmlns:a14="http://schemas.microsoft.com/office/drawing/2010/main" xmlns="">
                 <a:solidFill>
                   <a:srgbClr val="FFFFFF"/>
                 </a:solidFill>
               </a14:hiddenFill>
             </a:ext>
             <a:ext uri="{91240B29-F687-4F45-9708-019B960494DF}">
-              <a14:hiddenLine xmlns="" xmlns:a14="http://schemas.microsoft.com/office/drawing/2010/main" w="9525">
+              <a14:hiddenLine xmlns:a14="http://schemas.microsoft.com/office/drawing/2010/main" xmlns="" w="9525">
                 <a:solidFill>
                   <a:srgbClr val="000000"/>
                 </a:solidFill>
@@ -1402,14 +1402,14 @@
         <p:spPr bwMode="auto">
           <a:extLst>
             <a:ext uri="{909E8E84-426E-40DD-AFC4-6F175D3DCCD1}">
-              <a14:hiddenFill xmlns="" xmlns:a14="http://schemas.microsoft.com/office/drawing/2010/main">
+              <a14:hiddenFill xmlns:a14="http://schemas.microsoft.com/office/drawing/2010/main" xmlns="">
                 <a:solidFill>
                   <a:srgbClr val="FFFFFF"/>
                 </a:solidFill>
               </a14:hiddenFill>
             </a:ext>
             <a:ext uri="{91240B29-F687-4F45-9708-019B960494DF}">
-              <a14:hiddenLine xmlns="" xmlns:a14="http://schemas.microsoft.com/office/drawing/2010/main" w="9525">
+              <a14:hiddenLine xmlns:a14="http://schemas.microsoft.com/office/drawing/2010/main" xmlns="" w="9525">
                 <a:solidFill>
                   <a:srgbClr val="000000"/>
                 </a:solidFill>
@@ -1556,14 +1556,14 @@
         <p:spPr bwMode="auto">
           <a:extLst>
             <a:ext uri="{909E8E84-426E-40DD-AFC4-6F175D3DCCD1}">
-              <a14:hiddenFill xmlns="" xmlns:a14="http://schemas.microsoft.com/office/drawing/2010/main">
+              <a14:hiddenFill xmlns:a14="http://schemas.microsoft.com/office/drawing/2010/main" xmlns="">
                 <a:solidFill>
                   <a:srgbClr val="FFFFFF"/>
                 </a:solidFill>
               </a14:hiddenFill>
             </a:ext>
             <a:ext uri="{91240B29-F687-4F45-9708-019B960494DF}">
-              <a14:hiddenLine xmlns="" xmlns:a14="http://schemas.microsoft.com/office/drawing/2010/main" w="9525">
+              <a14:hiddenLine xmlns:a14="http://schemas.microsoft.com/office/drawing/2010/main" xmlns="" w="9525">
                 <a:solidFill>
                   <a:srgbClr val="000000"/>
                 </a:solidFill>
@@ -1731,7 +1731,7 @@
           </a:ln>
           <a:extLst>
             <a:ext uri="{909E8E84-426E-40DD-AFC4-6F175D3DCCD1}">
-              <a14:hiddenFill xmlns="" xmlns:a14="http://schemas.microsoft.com/office/drawing/2010/main">
+              <a14:hiddenFill xmlns:a14="http://schemas.microsoft.com/office/drawing/2010/main" xmlns="">
                 <a:solidFill>
                   <a:srgbClr val="FFFFFF"/>
                 </a:solidFill>
@@ -1758,14 +1758,14 @@
           <a:noFill/>
           <a:extLst>
             <a:ext uri="{909E8E84-426E-40DD-AFC4-6F175D3DCCD1}">
-              <a14:hiddenFill xmlns="" xmlns:a14="http://schemas.microsoft.com/office/drawing/2010/main">
+              <a14:hiddenFill xmlns:a14="http://schemas.microsoft.com/office/drawing/2010/main" xmlns="">
                 <a:solidFill>
                   <a:srgbClr val="FFFFFF"/>
                 </a:solidFill>
               </a14:hiddenFill>
             </a:ext>
             <a:ext uri="{91240B29-F687-4F45-9708-019B960494DF}">
-              <a14:hiddenLine xmlns="" xmlns:a14="http://schemas.microsoft.com/office/drawing/2010/main" w="9525">
+              <a14:hiddenLine xmlns:a14="http://schemas.microsoft.com/office/drawing/2010/main" xmlns="" w="9525">
                 <a:solidFill>
                   <a:srgbClr val="000000"/>
                 </a:solidFill>
@@ -1831,14 +1831,14 @@
         <p:spPr bwMode="auto">
           <a:extLst>
             <a:ext uri="{909E8E84-426E-40DD-AFC4-6F175D3DCCD1}">
-              <a14:hiddenFill xmlns="" xmlns:a14="http://schemas.microsoft.com/office/drawing/2010/main">
+              <a14:hiddenFill xmlns:a14="http://schemas.microsoft.com/office/drawing/2010/main" xmlns="">
                 <a:solidFill>
                   <a:srgbClr val="FFFFFF"/>
                 </a:solidFill>
               </a14:hiddenFill>
             </a:ext>
             <a:ext uri="{91240B29-F687-4F45-9708-019B960494DF}">
-              <a14:hiddenLine xmlns="" xmlns:a14="http://schemas.microsoft.com/office/drawing/2010/main" w="9525">
+              <a14:hiddenLine xmlns:a14="http://schemas.microsoft.com/office/drawing/2010/main" xmlns="" w="9525">
                 <a:solidFill>
                   <a:srgbClr val="000000"/>
                 </a:solidFill>
@@ -1985,14 +1985,14 @@
         <p:spPr bwMode="auto">
           <a:extLst>
             <a:ext uri="{909E8E84-426E-40DD-AFC4-6F175D3DCCD1}">
-              <a14:hiddenFill xmlns="" xmlns:a14="http://schemas.microsoft.com/office/drawing/2010/main">
+              <a14:hiddenFill xmlns:a14="http://schemas.microsoft.com/office/drawing/2010/main" xmlns="">
                 <a:solidFill>
                   <a:srgbClr val="FFFFFF"/>
                 </a:solidFill>
               </a14:hiddenFill>
             </a:ext>
             <a:ext uri="{91240B29-F687-4F45-9708-019B960494DF}">
-              <a14:hiddenLine xmlns="" xmlns:a14="http://schemas.microsoft.com/office/drawing/2010/main" w="9525">
+              <a14:hiddenLine xmlns:a14="http://schemas.microsoft.com/office/drawing/2010/main" xmlns="" w="9525">
                 <a:solidFill>
                   <a:srgbClr val="000000"/>
                 </a:solidFill>
@@ -2139,14 +2139,14 @@
         <p:spPr bwMode="auto">
           <a:extLst>
             <a:ext uri="{909E8E84-426E-40DD-AFC4-6F175D3DCCD1}">
-              <a14:hiddenFill xmlns="" xmlns:a14="http://schemas.microsoft.com/office/drawing/2010/main">
+              <a14:hiddenFill xmlns:a14="http://schemas.microsoft.com/office/drawing/2010/main" xmlns="">
                 <a:solidFill>
                   <a:srgbClr val="FFFFFF"/>
                 </a:solidFill>
               </a14:hiddenFill>
             </a:ext>
             <a:ext uri="{91240B29-F687-4F45-9708-019B960494DF}">
-              <a14:hiddenLine xmlns="" xmlns:a14="http://schemas.microsoft.com/office/drawing/2010/main" w="9525">
+              <a14:hiddenLine xmlns:a14="http://schemas.microsoft.com/office/drawing/2010/main" xmlns="" w="9525">
                 <a:solidFill>
                   <a:srgbClr val="000000"/>
                 </a:solidFill>
@@ -2293,14 +2293,14 @@
         <p:spPr bwMode="auto">
           <a:extLst>
             <a:ext uri="{909E8E84-426E-40DD-AFC4-6F175D3DCCD1}">
-              <a14:hiddenFill xmlns="" xmlns:a14="http://schemas.microsoft.com/office/drawing/2010/main">
+              <a14:hiddenFill xmlns:a14="http://schemas.microsoft.com/office/drawing/2010/main" xmlns="">
                 <a:solidFill>
                   <a:srgbClr val="FFFFFF"/>
                 </a:solidFill>
               </a14:hiddenFill>
             </a:ext>
             <a:ext uri="{91240B29-F687-4F45-9708-019B960494DF}">
-              <a14:hiddenLine xmlns="" xmlns:a14="http://schemas.microsoft.com/office/drawing/2010/main" w="9525">
+              <a14:hiddenLine xmlns:a14="http://schemas.microsoft.com/office/drawing/2010/main" xmlns="" w="9525">
                 <a:solidFill>
                   <a:srgbClr val="000000"/>
                 </a:solidFill>
@@ -2468,7 +2468,7 @@
           </a:ln>
           <a:extLst>
             <a:ext uri="{909E8E84-426E-40DD-AFC4-6F175D3DCCD1}">
-              <a14:hiddenFill xmlns="" xmlns:a14="http://schemas.microsoft.com/office/drawing/2010/main">
+              <a14:hiddenFill xmlns:a14="http://schemas.microsoft.com/office/drawing/2010/main" xmlns="">
                 <a:solidFill>
                   <a:srgbClr val="FFFFFF"/>
                 </a:solidFill>
@@ -2491,14 +2491,14 @@
           <a:noFill/>
           <a:extLst>
             <a:ext uri="{909E8E84-426E-40DD-AFC4-6F175D3DCCD1}">
-              <a14:hiddenFill xmlns="" xmlns:a14="http://schemas.microsoft.com/office/drawing/2010/main">
+              <a14:hiddenFill xmlns:a14="http://schemas.microsoft.com/office/drawing/2010/main" xmlns="">
                 <a:solidFill>
                   <a:srgbClr val="FFFFFF"/>
                 </a:solidFill>
               </a14:hiddenFill>
             </a:ext>
             <a:ext uri="{91240B29-F687-4F45-9708-019B960494DF}">
-              <a14:hiddenLine xmlns="" xmlns:a14="http://schemas.microsoft.com/office/drawing/2010/main" w="9525">
+              <a14:hiddenLine xmlns:a14="http://schemas.microsoft.com/office/drawing/2010/main" xmlns="" w="9525">
                 <a:solidFill>
                   <a:srgbClr val="000000"/>
                 </a:solidFill>
@@ -2564,14 +2564,14 @@
         <p:spPr bwMode="auto">
           <a:extLst>
             <a:ext uri="{909E8E84-426E-40DD-AFC4-6F175D3DCCD1}">
-              <a14:hiddenFill xmlns="" xmlns:a14="http://schemas.microsoft.com/office/drawing/2010/main">
+              <a14:hiddenFill xmlns:a14="http://schemas.microsoft.com/office/drawing/2010/main" xmlns="">
                 <a:solidFill>
                   <a:srgbClr val="FFFFFF"/>
                 </a:solidFill>
               </a14:hiddenFill>
             </a:ext>
             <a:ext uri="{91240B29-F687-4F45-9708-019B960494DF}">
-              <a14:hiddenLine xmlns="" xmlns:a14="http://schemas.microsoft.com/office/drawing/2010/main" w="9525">
+              <a14:hiddenLine xmlns:a14="http://schemas.microsoft.com/office/drawing/2010/main" xmlns="" w="9525">
                 <a:solidFill>
                   <a:srgbClr val="000000"/>
                 </a:solidFill>
@@ -2718,14 +2718,14 @@
         <p:spPr bwMode="auto">
           <a:extLst>
             <a:ext uri="{909E8E84-426E-40DD-AFC4-6F175D3DCCD1}">
-              <a14:hiddenFill xmlns="" xmlns:a14="http://schemas.microsoft.com/office/drawing/2010/main">
+              <a14:hiddenFill xmlns:a14="http://schemas.microsoft.com/office/drawing/2010/main" xmlns="">
                 <a:solidFill>
                   <a:srgbClr val="FFFFFF"/>
                 </a:solidFill>
               </a14:hiddenFill>
             </a:ext>
             <a:ext uri="{91240B29-F687-4F45-9708-019B960494DF}">
-              <a14:hiddenLine xmlns="" xmlns:a14="http://schemas.microsoft.com/office/drawing/2010/main" w="9525">
+              <a14:hiddenLine xmlns:a14="http://schemas.microsoft.com/office/drawing/2010/main" xmlns="" w="9525">
                 <a:solidFill>
                   <a:srgbClr val="000000"/>
                 </a:solidFill>
@@ -2872,14 +2872,14 @@
         <p:spPr bwMode="auto">
           <a:extLst>
             <a:ext uri="{909E8E84-426E-40DD-AFC4-6F175D3DCCD1}">
-              <a14:hiddenFill xmlns="" xmlns:a14="http://schemas.microsoft.com/office/drawing/2010/main">
+              <a14:hiddenFill xmlns:a14="http://schemas.microsoft.com/office/drawing/2010/main" xmlns="">
                 <a:solidFill>
                   <a:srgbClr val="FFFFFF"/>
                 </a:solidFill>
               </a14:hiddenFill>
             </a:ext>
             <a:ext uri="{91240B29-F687-4F45-9708-019B960494DF}">
-              <a14:hiddenLine xmlns="" xmlns:a14="http://schemas.microsoft.com/office/drawing/2010/main" w="9525">
+              <a14:hiddenLine xmlns:a14="http://schemas.microsoft.com/office/drawing/2010/main" xmlns="" w="9525">
                 <a:solidFill>
                   <a:srgbClr val="000000"/>
                 </a:solidFill>
@@ -3026,14 +3026,14 @@
         <p:spPr bwMode="auto">
           <a:extLst>
             <a:ext uri="{909E8E84-426E-40DD-AFC4-6F175D3DCCD1}">
-              <a14:hiddenFill xmlns="" xmlns:a14="http://schemas.microsoft.com/office/drawing/2010/main">
+              <a14:hiddenFill xmlns:a14="http://schemas.microsoft.com/office/drawing/2010/main" xmlns="">
                 <a:solidFill>
                   <a:srgbClr val="FFFFFF"/>
                 </a:solidFill>
               </a14:hiddenFill>
             </a:ext>
             <a:ext uri="{91240B29-F687-4F45-9708-019B960494DF}">
-              <a14:hiddenLine xmlns="" xmlns:a14="http://schemas.microsoft.com/office/drawing/2010/main" w="9525">
+              <a14:hiddenLine xmlns:a14="http://schemas.microsoft.com/office/drawing/2010/main" xmlns="" w="9525">
                 <a:solidFill>
                   <a:srgbClr val="000000"/>
                 </a:solidFill>
@@ -3201,7 +3201,7 @@
           </a:ln>
           <a:extLst>
             <a:ext uri="{909E8E84-426E-40DD-AFC4-6F175D3DCCD1}">
-              <a14:hiddenFill xmlns="" xmlns:a14="http://schemas.microsoft.com/office/drawing/2010/main">
+              <a14:hiddenFill xmlns:a14="http://schemas.microsoft.com/office/drawing/2010/main" xmlns="">
                 <a:solidFill>
                   <a:srgbClr val="FFFFFF"/>
                 </a:solidFill>
@@ -3224,14 +3224,14 @@
           <a:noFill/>
           <a:extLst>
             <a:ext uri="{909E8E84-426E-40DD-AFC4-6F175D3DCCD1}">
-              <a14:hiddenFill xmlns="" xmlns:a14="http://schemas.microsoft.com/office/drawing/2010/main">
+              <a14:hiddenFill xmlns:a14="http://schemas.microsoft.com/office/drawing/2010/main" xmlns="">
                 <a:solidFill>
                   <a:srgbClr val="FFFFFF"/>
                 </a:solidFill>
               </a14:hiddenFill>
             </a:ext>
             <a:ext uri="{91240B29-F687-4F45-9708-019B960494DF}">
-              <a14:hiddenLine xmlns="" xmlns:a14="http://schemas.microsoft.com/office/drawing/2010/main" w="9525">
+              <a14:hiddenLine xmlns:a14="http://schemas.microsoft.com/office/drawing/2010/main" xmlns="" w="9525">
                 <a:solidFill>
                   <a:srgbClr val="000000"/>
                 </a:solidFill>
@@ -3296,7 +3296,7 @@
           <a:blip r:embed="rId2" cstate="print">
             <a:extLst>
               <a:ext uri="{28A0092B-C50C-407E-A947-70E740481C1C}">
-                <a14:useLocalDpi xmlns="" xmlns:a14="http://schemas.microsoft.com/office/drawing/2010/main" val="0"/>
+                <a14:useLocalDpi xmlns:a14="http://schemas.microsoft.com/office/drawing/2010/main" xmlns="" val="0"/>
               </a:ext>
             </a:extLst>
           </a:blip>
@@ -3320,14 +3320,14 @@
           <a:effectLst/>
           <a:extLst>
             <a:ext uri="{909E8E84-426E-40DD-AFC4-6F175D3DCCD1}">
-              <a14:hiddenFill xmlns="" xmlns:a14="http://schemas.microsoft.com/office/drawing/2010/main">
+              <a14:hiddenFill xmlns:a14="http://schemas.microsoft.com/office/drawing/2010/main" xmlns="">
                 <a:solidFill>
                   <a:schemeClr val="accent1"/>
                 </a:solidFill>
               </a14:hiddenFill>
             </a:ext>
             <a:ext uri="{91240B29-F687-4F45-9708-019B960494DF}">
-              <a14:hiddenLine xmlns="" xmlns:a14="http://schemas.microsoft.com/office/drawing/2010/main" w="12700" algn="ctr">
+              <a14:hiddenLine xmlns:a14="http://schemas.microsoft.com/office/drawing/2010/main" xmlns="" w="12700" algn="ctr">
                 <a:solidFill>
                   <a:schemeClr val="tx1"/>
                 </a:solidFill>
@@ -3337,7 +3337,7 @@
               </a14:hiddenLine>
             </a:ext>
             <a:ext uri="{AF507438-7753-43E0-B8FC-AC1667EBCBE1}">
-              <a14:hiddenEffects xmlns="" xmlns:a14="http://schemas.microsoft.com/office/drawing/2010/main">
+              <a14:hiddenEffects xmlns:a14="http://schemas.microsoft.com/office/drawing/2010/main" xmlns="">
                 <a:effectLst>
                   <a:outerShdw dist="35921" dir="2700000" algn="ctr" rotWithShape="0">
                     <a:schemeClr val="bg2"/>
@@ -3378,7 +3378,7 @@
             <a:blip r:embed="rId4" cstate="print">
               <a:extLst>
                 <a:ext uri="{28A0092B-C50C-407E-A947-70E740481C1C}">
-                  <a14:useLocalDpi xmlns="" xmlns:a14="http://schemas.microsoft.com/office/drawing/2010/main" val="0"/>
+                  <a14:useLocalDpi xmlns:a14="http://schemas.microsoft.com/office/drawing/2010/main" xmlns="" val="0"/>
                 </a:ext>
               </a:extLst>
             </a:blip>
@@ -3401,14 +3401,14 @@
             </a:ln>
             <a:extLst>
               <a:ext uri="{909E8E84-426E-40DD-AFC4-6F175D3DCCD1}">
-                <a14:hiddenFill xmlns="" xmlns:a14="http://schemas.microsoft.com/office/drawing/2010/main">
+                <a14:hiddenFill xmlns:a14="http://schemas.microsoft.com/office/drawing/2010/main" xmlns="">
                   <a:solidFill>
                     <a:srgbClr val="FFFFFF"/>
                   </a:solidFill>
                 </a14:hiddenFill>
               </a:ext>
               <a:ext uri="{91240B29-F687-4F45-9708-019B960494DF}">
-                <a14:hiddenLine xmlns="" xmlns:a14="http://schemas.microsoft.com/office/drawing/2010/main" w="9525">
+                <a14:hiddenLine xmlns:a14="http://schemas.microsoft.com/office/drawing/2010/main" xmlns="" w="9525">
                   <a:solidFill>
                     <a:srgbClr val="000000"/>
                   </a:solidFill>
@@ -3442,14 +3442,14 @@
             </a:ln>
             <a:extLst>
               <a:ext uri="{909E8E84-426E-40DD-AFC4-6F175D3DCCD1}">
-                <a14:hiddenFill xmlns="" xmlns:a14="http://schemas.microsoft.com/office/drawing/2010/main">
+                <a14:hiddenFill xmlns:a14="http://schemas.microsoft.com/office/drawing/2010/main" xmlns="">
                   <a:solidFill>
                     <a:srgbClr val="FFFFFF"/>
                   </a:solidFill>
                 </a14:hiddenFill>
               </a:ext>
               <a:ext uri="{91240B29-F687-4F45-9708-019B960494DF}">
-                <a14:hiddenLine xmlns="" xmlns:a14="http://schemas.microsoft.com/office/drawing/2010/main" w="9525">
+                <a14:hiddenLine xmlns:a14="http://schemas.microsoft.com/office/drawing/2010/main" xmlns="" w="9525">
                   <a:solidFill>
                     <a:srgbClr val="000000"/>
                   </a:solidFill>
@@ -3621,14 +3621,14 @@
           </a:ln>
           <a:extLst>
             <a:ext uri="{909E8E84-426E-40DD-AFC4-6F175D3DCCD1}">
-              <a14:hiddenFill xmlns="" xmlns:a14="http://schemas.microsoft.com/office/drawing/2010/main">
+              <a14:hiddenFill xmlns:a14="http://schemas.microsoft.com/office/drawing/2010/main" xmlns="">
                 <a:solidFill>
                   <a:srgbClr val="FFFFFF"/>
                 </a:solidFill>
               </a14:hiddenFill>
             </a:ext>
             <a:ext uri="{91240B29-F687-4F45-9708-019B960494DF}">
-              <a14:hiddenLine xmlns="" xmlns:a14="http://schemas.microsoft.com/office/drawing/2010/main" w="9525">
+              <a14:hiddenLine xmlns:a14="http://schemas.microsoft.com/office/drawing/2010/main" xmlns="" w="9525">
                 <a:solidFill>
                   <a:srgbClr val="000000"/>
                 </a:solidFill>
@@ -4005,7 +4005,7 @@
     </p:spTree>
     <p:extLst>
       <p:ext uri="{BB962C8B-B14F-4D97-AF65-F5344CB8AC3E}">
-        <p14:creationId xmlns="" xmlns:p14="http://schemas.microsoft.com/office/powerpoint/2010/main" val="2588080409"/>
+        <p14:creationId xmlns:p14="http://schemas.microsoft.com/office/powerpoint/2010/main" xmlns="" val="2588080409"/>
       </p:ext>
     </p:extLst>
   </p:cSld>
@@ -4236,7 +4236,7 @@
     </p:spTree>
     <p:extLst>
       <p:ext uri="{BB962C8B-B14F-4D97-AF65-F5344CB8AC3E}">
-        <p14:creationId xmlns="" xmlns:p14="http://schemas.microsoft.com/office/powerpoint/2010/main" val="2741523762"/>
+        <p14:creationId xmlns:p14="http://schemas.microsoft.com/office/powerpoint/2010/main" xmlns="" val="2741523762"/>
       </p:ext>
     </p:extLst>
   </p:cSld>
@@ -4468,7 +4468,7 @@
     </p:spTree>
     <p:extLst>
       <p:ext uri="{BB962C8B-B14F-4D97-AF65-F5344CB8AC3E}">
-        <p14:creationId xmlns="" xmlns:p14="http://schemas.microsoft.com/office/powerpoint/2010/main" val="2682078689"/>
+        <p14:creationId xmlns:p14="http://schemas.microsoft.com/office/powerpoint/2010/main" xmlns="" val="2682078689"/>
       </p:ext>
     </p:extLst>
   </p:cSld>
@@ -4813,7 +4813,7 @@
     </p:spTree>
     <p:extLst>
       <p:ext uri="{BB962C8B-B14F-4D97-AF65-F5344CB8AC3E}">
-        <p14:creationId xmlns="" xmlns:p14="http://schemas.microsoft.com/office/powerpoint/2010/main" val="1967580509"/>
+        <p14:creationId xmlns:p14="http://schemas.microsoft.com/office/powerpoint/2010/main" xmlns="" val="1967580509"/>
       </p:ext>
     </p:extLst>
   </p:cSld>
@@ -5278,7 +5278,7 @@
     </p:spTree>
     <p:extLst>
       <p:ext uri="{BB962C8B-B14F-4D97-AF65-F5344CB8AC3E}">
-        <p14:creationId xmlns="" xmlns:p14="http://schemas.microsoft.com/office/powerpoint/2010/main" val="4110782242"/>
+        <p14:creationId xmlns:p14="http://schemas.microsoft.com/office/powerpoint/2010/main" xmlns="" val="4110782242"/>
       </p:ext>
     </p:extLst>
   </p:cSld>
@@ -5436,7 +5436,7 @@
     </p:spTree>
     <p:extLst>
       <p:ext uri="{BB962C8B-B14F-4D97-AF65-F5344CB8AC3E}">
-        <p14:creationId xmlns="" xmlns:p14="http://schemas.microsoft.com/office/powerpoint/2010/main" val="1892974325"/>
+        <p14:creationId xmlns:p14="http://schemas.microsoft.com/office/powerpoint/2010/main" xmlns="" val="1892974325"/>
       </p:ext>
     </p:extLst>
   </p:cSld>
@@ -5566,7 +5566,7 @@
     </p:spTree>
     <p:extLst>
       <p:ext uri="{BB962C8B-B14F-4D97-AF65-F5344CB8AC3E}">
-        <p14:creationId xmlns="" xmlns:p14="http://schemas.microsoft.com/office/powerpoint/2010/main" val="606310080"/>
+        <p14:creationId xmlns:p14="http://schemas.microsoft.com/office/powerpoint/2010/main" xmlns="" val="606310080"/>
       </p:ext>
     </p:extLst>
   </p:cSld>
@@ -5607,7 +5607,7 @@
           <a:blip r:embed="rId3" cstate="print">
             <a:extLst>
               <a:ext uri="{28A0092B-C50C-407E-A947-70E740481C1C}">
-                <a14:useLocalDpi xmlns="" xmlns:a14="http://schemas.microsoft.com/office/drawing/2010/main" val="0"/>
+                <a14:useLocalDpi xmlns:a14="http://schemas.microsoft.com/office/drawing/2010/main" xmlns="" val="0"/>
               </a:ext>
             </a:extLst>
           </a:blip>
@@ -5630,14 +5630,14 @@
           </a:ln>
           <a:extLst>
             <a:ext uri="{909E8E84-426E-40DD-AFC4-6F175D3DCCD1}">
-              <a14:hiddenFill xmlns="" xmlns:a14="http://schemas.microsoft.com/office/drawing/2010/main">
+              <a14:hiddenFill xmlns:a14="http://schemas.microsoft.com/office/drawing/2010/main" xmlns="">
                 <a:solidFill>
                   <a:srgbClr val="FFFFFF"/>
                 </a:solidFill>
               </a14:hiddenFill>
             </a:ext>
             <a:ext uri="{91240B29-F687-4F45-9708-019B960494DF}">
-              <a14:hiddenLine xmlns="" xmlns:a14="http://schemas.microsoft.com/office/drawing/2010/main" w="9525">
+              <a14:hiddenLine xmlns:a14="http://schemas.microsoft.com/office/drawing/2010/main" xmlns="" w="9525">
                 <a:solidFill>
                   <a:srgbClr val="000000"/>
                 </a:solidFill>
@@ -5798,7 +5798,7 @@
     </p:spTree>
     <p:extLst>
       <p:ext uri="{BB962C8B-B14F-4D97-AF65-F5344CB8AC3E}">
-        <p14:creationId xmlns="" xmlns:p14="http://schemas.microsoft.com/office/powerpoint/2010/main" val="1504093363"/>
+        <p14:creationId xmlns:p14="http://schemas.microsoft.com/office/powerpoint/2010/main" xmlns="" val="1504093363"/>
       </p:ext>
     </p:extLst>
   </p:cSld>
@@ -5859,14 +5859,14 @@
           </a:ln>
           <a:extLst>
             <a:ext uri="{909E8E84-426E-40DD-AFC4-6F175D3DCCD1}">
-              <a14:hiddenFill xmlns="" xmlns:a14="http://schemas.microsoft.com/office/drawing/2010/main">
+              <a14:hiddenFill xmlns:a14="http://schemas.microsoft.com/office/drawing/2010/main" xmlns="">
                 <a:solidFill>
                   <a:srgbClr val="FFFFFF"/>
                 </a:solidFill>
               </a14:hiddenFill>
             </a:ext>
             <a:ext uri="{91240B29-F687-4F45-9708-019B960494DF}">
-              <a14:hiddenLine xmlns="" xmlns:a14="http://schemas.microsoft.com/office/drawing/2010/main" w="9525">
+              <a14:hiddenLine xmlns:a14="http://schemas.microsoft.com/office/drawing/2010/main" xmlns="" w="9525">
                 <a:solidFill>
                   <a:srgbClr val="000000"/>
                 </a:solidFill>
@@ -5917,14 +5917,14 @@
           </a:ln>
           <a:extLst>
             <a:ext uri="{909E8E84-426E-40DD-AFC4-6F175D3DCCD1}">
-              <a14:hiddenFill xmlns="" xmlns:a14="http://schemas.microsoft.com/office/drawing/2010/main">
+              <a14:hiddenFill xmlns:a14="http://schemas.microsoft.com/office/drawing/2010/main" xmlns="">
                 <a:solidFill>
                   <a:srgbClr val="FFFFFF"/>
                 </a:solidFill>
               </a14:hiddenFill>
             </a:ext>
             <a:ext uri="{91240B29-F687-4F45-9708-019B960494DF}">
-              <a14:hiddenLine xmlns="" xmlns:a14="http://schemas.microsoft.com/office/drawing/2010/main" w="9525">
+              <a14:hiddenLine xmlns:a14="http://schemas.microsoft.com/office/drawing/2010/main" xmlns="" w="9525">
                 <a:solidFill>
                   <a:srgbClr val="000000"/>
                 </a:solidFill>
@@ -6269,7 +6269,7 @@
           <a:blip r:embed="rId11" cstate="print">
             <a:extLst>
               <a:ext uri="{28A0092B-C50C-407E-A947-70E740481C1C}">
-                <a14:useLocalDpi xmlns="" xmlns:a14="http://schemas.microsoft.com/office/drawing/2010/main" val="0"/>
+                <a14:useLocalDpi xmlns:a14="http://schemas.microsoft.com/office/drawing/2010/main" xmlns="" val="0"/>
               </a:ext>
             </a:extLst>
           </a:blip>
@@ -6292,14 +6292,14 @@
           </a:ln>
           <a:extLst>
             <a:ext uri="{909E8E84-426E-40DD-AFC4-6F175D3DCCD1}">
-              <a14:hiddenFill xmlns="" xmlns:a14="http://schemas.microsoft.com/office/drawing/2010/main">
+              <a14:hiddenFill xmlns:a14="http://schemas.microsoft.com/office/drawing/2010/main" xmlns="">
                 <a:solidFill>
                   <a:srgbClr val="FFFFFF"/>
                 </a:solidFill>
               </a14:hiddenFill>
             </a:ext>
             <a:ext uri="{91240B29-F687-4F45-9708-019B960494DF}">
-              <a14:hiddenLine xmlns="" xmlns:a14="http://schemas.microsoft.com/office/drawing/2010/main" w="9525">
+              <a14:hiddenLine xmlns:a14="http://schemas.microsoft.com/office/drawing/2010/main" xmlns="" w="9525">
                 <a:solidFill>
                   <a:srgbClr val="000000"/>
                 </a:solidFill>
@@ -7255,7 +7255,7 @@
       </p:sp>
       <p:pic>
         <p:nvPicPr>
-          <p:cNvPr id="8194" name="Picture 2" descr="C:\Users\Kevin\Desktop\Capstone\infographic-generator\documents\presentations\beta-presentation\Service2.png"/>
+          <p:cNvPr id="1027" name="Picture 3"/>
           <p:cNvPicPr>
             <a:picLocks noChangeAspect="1" noChangeArrowheads="1"/>
           </p:cNvPicPr>
@@ -7277,6 +7277,13 @@
             <a:avLst/>
           </a:prstGeom>
           <a:noFill/>
+          <a:ln w="9525">
+            <a:noFill/>
+            <a:miter lim="800000"/>
+            <a:headEnd/>
+            <a:tailEnd/>
+          </a:ln>
+          <a:effectLst/>
         </p:spPr>
       </p:pic>
     </p:spTree>
@@ -7359,11 +7366,7 @@
             <a:pPr eaLnBrk="1" hangingPunct="1"/>
             <a:r>
               <a:rPr lang="en-US" dirty="0" smtClean="0"/>
-              <a:t>Project Plan </a:t>
-            </a:r>
-            <a:r>
-              <a:rPr lang="en-US" dirty="0" smtClean="0"/>
-              <a:t>Document</a:t>
+              <a:t>Project Plan Document</a:t>
             </a:r>
           </a:p>
           <a:p>
@@ -7385,23 +7388,14 @@
             </a:r>
             <a:r>
               <a:rPr lang="en-US" dirty="0" smtClean="0"/>
-              <a:t> </a:t>
-            </a:r>
+              <a:t> Bugs</a:t>
+            </a:r>
+          </a:p>
+          <a:p>
+            <a:pPr eaLnBrk="1" hangingPunct="1"/>
             <a:r>
               <a:rPr lang="en-US" dirty="0" smtClean="0"/>
-              <a:t>Bugs</a:t>
-            </a:r>
-            <a:endParaRPr lang="en-US" dirty="0" smtClean="0"/>
-          </a:p>
-          <a:p>
-            <a:pPr eaLnBrk="1" hangingPunct="1"/>
-            <a:r>
-              <a:rPr lang="en-US" dirty="0" smtClean="0"/>
-              <a:t>Popup Close Causes </a:t>
-            </a:r>
-            <a:r>
-              <a:rPr lang="en-US" dirty="0" smtClean="0"/>
-              <a:t>Swipe Gesture</a:t>
+              <a:t>Popup Close Causes Swipe Gesture</a:t>
             </a:r>
           </a:p>
           <a:p>
@@ -7416,17 +7410,8 @@
             </a:r>
             <a:r>
               <a:rPr lang="en-US" dirty="0" smtClean="0"/>
-              <a:t> Orientation </a:t>
-            </a:r>
-            <a:r>
-              <a:rPr lang="en-US" dirty="0" smtClean="0"/>
-              <a:t>I</a:t>
-            </a:r>
-            <a:r>
-              <a:rPr lang="en-US" dirty="0" smtClean="0"/>
-              <a:t>ssue</a:t>
-            </a:r>
-            <a:endParaRPr lang="en-US" dirty="0" smtClean="0"/>
+              <a:t> Orientation Issue</a:t>
+            </a:r>
           </a:p>
           <a:p>
             <a:pPr eaLnBrk="1" hangingPunct="1"/>
@@ -7938,11 +7923,7 @@
             <a:pPr eaLnBrk="1" hangingPunct="1"/>
             <a:r>
               <a:rPr lang="en-US" dirty="0" smtClean="0"/>
-              <a:t>Home </a:t>
-            </a:r>
-            <a:r>
-              <a:rPr lang="en-US" dirty="0" smtClean="0"/>
-              <a:t>Page (Portrait)</a:t>
+              <a:t>Home Page (Portrait)</a:t>
             </a:r>
             <a:endParaRPr lang="en-US" sz="1800" dirty="0" smtClean="0"/>
           </a:p>
@@ -8112,11 +8093,7 @@
             <a:pPr eaLnBrk="1" hangingPunct="1"/>
             <a:r>
               <a:rPr lang="en-US" dirty="0" smtClean="0"/>
-              <a:t>Home </a:t>
-            </a:r>
-            <a:r>
-              <a:rPr lang="en-US" dirty="0" smtClean="0"/>
-              <a:t>Page (Landscape)</a:t>
+              <a:t>Home Page (Landscape)</a:t>
             </a:r>
             <a:endParaRPr lang="en-US" sz="1800" dirty="0" smtClean="0"/>
           </a:p>

</xml_diff>